<commit_message>
Creacion de todos los archivos necesarios
</commit_message>
<xml_diff>
--- a/Documentos/Diagrama de clases .pptx
+++ b/Documentos/Diagrama de clases .pptx
@@ -244,7 +244,7 @@
           <a:p>
             <a:fld id="{761B82EC-0E7A-1D43-9F13-C1D8E66B749A}" type="datetimeFigureOut">
               <a:rPr lang="en-CO" smtClean="0"/>
-              <a:t>05/17/2025</a:t>
+              <a:t>05/19/2025</a:t>
             </a:fld>
             <a:endParaRPr lang="en-CO"/>
           </a:p>
@@ -414,7 +414,7 @@
           <a:p>
             <a:fld id="{761B82EC-0E7A-1D43-9F13-C1D8E66B749A}" type="datetimeFigureOut">
               <a:rPr lang="en-CO" smtClean="0"/>
-              <a:t>05/17/2025</a:t>
+              <a:t>05/19/2025</a:t>
             </a:fld>
             <a:endParaRPr lang="en-CO"/>
           </a:p>
@@ -594,7 +594,7 @@
           <a:p>
             <a:fld id="{761B82EC-0E7A-1D43-9F13-C1D8E66B749A}" type="datetimeFigureOut">
               <a:rPr lang="en-CO" smtClean="0"/>
-              <a:t>05/17/2025</a:t>
+              <a:t>05/19/2025</a:t>
             </a:fld>
             <a:endParaRPr lang="en-CO"/>
           </a:p>
@@ -764,7 +764,7 @@
           <a:p>
             <a:fld id="{761B82EC-0E7A-1D43-9F13-C1D8E66B749A}" type="datetimeFigureOut">
               <a:rPr lang="en-CO" smtClean="0"/>
-              <a:t>05/17/2025</a:t>
+              <a:t>05/19/2025</a:t>
             </a:fld>
             <a:endParaRPr lang="en-CO"/>
           </a:p>
@@ -1010,7 +1010,7 @@
           <a:p>
             <a:fld id="{761B82EC-0E7A-1D43-9F13-C1D8E66B749A}" type="datetimeFigureOut">
               <a:rPr lang="en-CO" smtClean="0"/>
-              <a:t>05/17/2025</a:t>
+              <a:t>05/19/2025</a:t>
             </a:fld>
             <a:endParaRPr lang="en-CO"/>
           </a:p>
@@ -1242,7 +1242,7 @@
           <a:p>
             <a:fld id="{761B82EC-0E7A-1D43-9F13-C1D8E66B749A}" type="datetimeFigureOut">
               <a:rPr lang="en-CO" smtClean="0"/>
-              <a:t>05/17/2025</a:t>
+              <a:t>05/19/2025</a:t>
             </a:fld>
             <a:endParaRPr lang="en-CO"/>
           </a:p>
@@ -1609,7 +1609,7 @@
           <a:p>
             <a:fld id="{761B82EC-0E7A-1D43-9F13-C1D8E66B749A}" type="datetimeFigureOut">
               <a:rPr lang="en-CO" smtClean="0"/>
-              <a:t>05/17/2025</a:t>
+              <a:t>05/19/2025</a:t>
             </a:fld>
             <a:endParaRPr lang="en-CO"/>
           </a:p>
@@ -1727,7 +1727,7 @@
           <a:p>
             <a:fld id="{761B82EC-0E7A-1D43-9F13-C1D8E66B749A}" type="datetimeFigureOut">
               <a:rPr lang="en-CO" smtClean="0"/>
-              <a:t>05/17/2025</a:t>
+              <a:t>05/19/2025</a:t>
             </a:fld>
             <a:endParaRPr lang="en-CO"/>
           </a:p>
@@ -1822,7 +1822,7 @@
           <a:p>
             <a:fld id="{761B82EC-0E7A-1D43-9F13-C1D8E66B749A}" type="datetimeFigureOut">
               <a:rPr lang="en-CO" smtClean="0"/>
-              <a:t>05/17/2025</a:t>
+              <a:t>05/19/2025</a:t>
             </a:fld>
             <a:endParaRPr lang="en-CO"/>
           </a:p>
@@ -2099,7 +2099,7 @@
           <a:p>
             <a:fld id="{761B82EC-0E7A-1D43-9F13-C1D8E66B749A}" type="datetimeFigureOut">
               <a:rPr lang="en-CO" smtClean="0"/>
-              <a:t>05/17/2025</a:t>
+              <a:t>05/19/2025</a:t>
             </a:fld>
             <a:endParaRPr lang="en-CO"/>
           </a:p>
@@ -2356,7 +2356,7 @@
           <a:p>
             <a:fld id="{761B82EC-0E7A-1D43-9F13-C1D8E66B749A}" type="datetimeFigureOut">
               <a:rPr lang="en-CO" smtClean="0"/>
-              <a:t>05/17/2025</a:t>
+              <a:t>05/19/2025</a:t>
             </a:fld>
             <a:endParaRPr lang="en-CO"/>
           </a:p>
@@ -2569,7 +2569,7 @@
           <a:p>
             <a:fld id="{761B82EC-0E7A-1D43-9F13-C1D8E66B749A}" type="datetimeFigureOut">
               <a:rPr lang="en-CO" smtClean="0"/>
-              <a:t>05/17/2025</a:t>
+              <a:t>05/19/2025</a:t>
             </a:fld>
             <a:endParaRPr lang="en-CO"/>
           </a:p>
@@ -2989,14 +2989,14 @@
           <p:nvPr>
             <p:extLst>
               <p:ext uri="{D42A27DB-BD31-4B8C-83A1-F6EECF244321}">
-                <p14:modId xmlns:p14="http://schemas.microsoft.com/office/powerpoint/2010/main" val="2285992520"/>
+                <p14:modId xmlns:p14="http://schemas.microsoft.com/office/powerpoint/2010/main" val="1994567745"/>
               </p:ext>
             </p:extLst>
           </p:nvPr>
         </p:nvGraphicFramePr>
         <p:xfrm>
-          <a:off x="3808273" y="131121"/>
-          <a:ext cx="1527453" cy="2522220"/>
+          <a:off x="3808276" y="241"/>
+          <a:ext cx="1527453" cy="2278380"/>
         </p:xfrm>
         <a:graphic>
           <a:graphicData uri="http://schemas.openxmlformats.org/drawingml/2006/table">
@@ -3043,7 +3043,7 @@
                     <a:p>
                       <a:r>
                         <a:rPr lang="en-US" sz="800" dirty="0"/>
-                        <a:t>– </a:t>
+                        <a:t>- </a:t>
                       </a:r>
                       <a:r>
                         <a:rPr lang="en-US" sz="800" dirty="0" err="1"/>
@@ -3057,7 +3057,7 @@
                     <a:p>
                       <a:r>
                         <a:rPr lang="en-US" sz="800" dirty="0"/>
-                        <a:t>– </a:t>
+                        <a:t>- </a:t>
                       </a:r>
                       <a:r>
                         <a:rPr lang="en-US" sz="800" dirty="0" err="1"/>
@@ -3071,7 +3071,7 @@
                     <a:p>
                       <a:r>
                         <a:rPr lang="en-US" sz="800" dirty="0"/>
-                        <a:t>– </a:t>
+                        <a:t>- </a:t>
                       </a:r>
                       <a:r>
                         <a:rPr lang="en-US" sz="800" dirty="0" err="1"/>
@@ -3375,634 +3375,7 @@
                         <a:rPr lang="es-419" sz="800" dirty="0" err="1"/>
                         <a:t>bool</a:t>
                       </a:r>
-                      <a:endParaRPr lang="es-419" sz="800" dirty="0"/>
-                    </a:p>
-                    <a:p>
-                      <a:r>
-                        <a:rPr lang="es-419" sz="800" dirty="0"/>
-                        <a:t>+ </a:t>
-                      </a:r>
-                      <a:r>
-                        <a:rPr lang="es-419" sz="800" dirty="0" err="1"/>
-                        <a:t>operator</a:t>
-                      </a:r>
-                      <a:r>
-                        <a:rPr lang="es-419" sz="800" dirty="0"/>
-                        <a:t>+(</a:t>
-                      </a:r>
-                      <a:r>
-                        <a:rPr lang="es-419" sz="800" dirty="0" err="1"/>
-                        <a:t>cantidadNoches</a:t>
-                      </a:r>
-                      <a:r>
-                        <a:rPr lang="es-419" sz="800" dirty="0"/>
-                        <a:t>: </a:t>
-                      </a:r>
-                      <a:r>
-                        <a:rPr lang="es-419" sz="800" dirty="0" err="1"/>
-                        <a:t>int</a:t>
-                      </a:r>
-                      <a:r>
-                        <a:rPr lang="es-419" sz="800" dirty="0"/>
-                        <a:t>): Fecha</a:t>
-                      </a:r>
                       <a:endParaRPr lang="en-CO" sz="800" dirty="0"/>
-                    </a:p>
-                  </a:txBody>
-                  <a:tcPr marL="68580" marR="68580" marT="34290" marB="34290"/>
-                </a:tc>
-                <a:extLst>
-                  <a:ext uri="{0D108BD9-81ED-4DB2-BD59-A6C34878D82A}">
-                    <a16:rowId xmlns:a16="http://schemas.microsoft.com/office/drawing/2014/main" val="2815277544"/>
-                  </a:ext>
-                </a:extLst>
-              </a:tr>
-            </a:tbl>
-          </a:graphicData>
-        </a:graphic>
-      </p:graphicFrame>
-      <p:graphicFrame>
-        <p:nvGraphicFramePr>
-          <p:cNvPr id="8" name="Table 7">
-            <a:extLst>
-              <a:ext uri="{FF2B5EF4-FFF2-40B4-BE49-F238E27FC236}">
-                <a16:creationId xmlns:a16="http://schemas.microsoft.com/office/drawing/2014/main" id="{DBA6ECAA-FB23-3C26-7FC4-D2B8AF74520F}"/>
-              </a:ext>
-            </a:extLst>
-          </p:cNvPr>
-          <p:cNvGraphicFramePr>
-            <a:graphicFrameLocks noGrp="1"/>
-          </p:cNvGraphicFramePr>
-          <p:nvPr>
-            <p:extLst>
-              <p:ext uri="{D42A27DB-BD31-4B8C-83A1-F6EECF244321}">
-                <p14:modId xmlns:p14="http://schemas.microsoft.com/office/powerpoint/2010/main" val="208122489"/>
-              </p:ext>
-            </p:extLst>
-          </p:nvPr>
-        </p:nvGraphicFramePr>
-        <p:xfrm>
-          <a:off x="556283" y="5096517"/>
-          <a:ext cx="2388550" cy="3771900"/>
-        </p:xfrm>
-        <a:graphic>
-          <a:graphicData uri="http://schemas.openxmlformats.org/drawingml/2006/table">
-            <a:tbl>
-              <a:tblPr firstRow="1" bandRow="1">
-                <a:tableStyleId>{5940675A-B579-460E-94D1-54222C63F5DA}</a:tableStyleId>
-              </a:tblPr>
-              <a:tblGrid>
-                <a:gridCol w="2388550">
-                  <a:extLst>
-                    <a:ext uri="{9D8B030D-6E8A-4147-A177-3AD203B41FA5}">
-                      <a16:colId xmlns:a16="http://schemas.microsoft.com/office/drawing/2014/main" val="2587242417"/>
-                    </a:ext>
-                  </a:extLst>
-                </a:gridCol>
-              </a:tblGrid>
-              <a:tr h="110327">
-                <a:tc>
-                  <a:txBody>
-                    <a:bodyPr/>
-                    <a:lstStyle/>
-                    <a:p>
-                      <a:pPr algn="ctr"/>
-                      <a:r>
-                        <a:rPr lang="es-419" sz="900" dirty="0"/>
-                        <a:t>Huésped</a:t>
-                      </a:r>
-                      <a:endParaRPr lang="en-CO" sz="900" dirty="0"/>
-                    </a:p>
-                  </a:txBody>
-                  <a:tcPr marL="68580" marR="68580" marT="34290" marB="34290"/>
-                </a:tc>
-                <a:extLst>
-                  <a:ext uri="{0D108BD9-81ED-4DB2-BD59-A6C34878D82A}">
-                    <a16:rowId xmlns:a16="http://schemas.microsoft.com/office/drawing/2014/main" val="3263559475"/>
-                  </a:ext>
-                </a:extLst>
-              </a:tr>
-              <a:tr h="640080">
-                <a:tc>
-                  <a:txBody>
-                    <a:bodyPr/>
-                    <a:lstStyle/>
-                    <a:p>
-                      <a:r>
-                        <a:rPr lang="es-ES" sz="900" dirty="0"/>
-                        <a:t>– documento: </a:t>
-                      </a:r>
-                      <a:r>
-                        <a:rPr lang="es-ES" sz="900" dirty="0" err="1"/>
-                        <a:t>char</a:t>
-                      </a:r>
-                      <a:r>
-                        <a:rPr lang="es-ES" sz="900" dirty="0"/>
-                        <a:t>*</a:t>
-                      </a:r>
-                    </a:p>
-                    <a:p>
-                      <a:r>
-                        <a:rPr lang="es-ES" sz="900" dirty="0"/>
-                        <a:t>– nombre: </a:t>
-                      </a:r>
-                      <a:r>
-                        <a:rPr lang="es-ES" sz="900" dirty="0" err="1"/>
-                        <a:t>char</a:t>
-                      </a:r>
-                      <a:r>
-                        <a:rPr lang="es-ES" sz="900" dirty="0"/>
-                        <a:t>*</a:t>
-                      </a:r>
-                    </a:p>
-                    <a:p>
-                      <a:r>
-                        <a:rPr lang="es-ES" sz="900" dirty="0"/>
-                        <a:t>– </a:t>
-                      </a:r>
-                      <a:r>
-                        <a:rPr lang="es-ES" sz="900" dirty="0" err="1"/>
-                        <a:t>antiguedadEnMeses</a:t>
-                      </a:r>
-                      <a:r>
-                        <a:rPr lang="es-ES" sz="900" dirty="0"/>
-                        <a:t>: </a:t>
-                      </a:r>
-                      <a:r>
-                        <a:rPr lang="es-ES" sz="900" dirty="0" err="1"/>
-                        <a:t>int</a:t>
-                      </a:r>
-                      <a:endParaRPr lang="es-ES" sz="900" dirty="0"/>
-                    </a:p>
-                    <a:p>
-                      <a:r>
-                        <a:rPr lang="es-ES" sz="900" dirty="0"/>
-                        <a:t>– </a:t>
-                      </a:r>
-                      <a:r>
-                        <a:rPr lang="es-ES" sz="900" dirty="0" err="1"/>
-                        <a:t>puntuacion</a:t>
-                      </a:r>
-                      <a:r>
-                        <a:rPr lang="es-ES" sz="900" dirty="0"/>
-                        <a:t>: </a:t>
-                      </a:r>
-                      <a:r>
-                        <a:rPr lang="es-ES" sz="900" dirty="0" err="1"/>
-                        <a:t>float</a:t>
-                      </a:r>
-                      <a:endParaRPr lang="es-ES" sz="900" dirty="0"/>
-                    </a:p>
-                    <a:p>
-                      <a:r>
-                        <a:rPr lang="es-ES" sz="900" dirty="0"/>
-                        <a:t>– </a:t>
-                      </a:r>
-                      <a:r>
-                        <a:rPr lang="es-ES" sz="900" dirty="0" err="1"/>
-                        <a:t>listaReservaciones</a:t>
-                      </a:r>
-                      <a:r>
-                        <a:rPr lang="es-ES" sz="900" dirty="0"/>
-                        <a:t>: </a:t>
-                      </a:r>
-                      <a:r>
-                        <a:rPr lang="es-ES" sz="900" dirty="0" err="1"/>
-                        <a:t>Reservacion</a:t>
-                      </a:r>
-                      <a:r>
-                        <a:rPr lang="es-ES" sz="900" dirty="0"/>
-                        <a:t>**</a:t>
-                      </a:r>
-                    </a:p>
-                    <a:p>
-                      <a:r>
-                        <a:rPr lang="es-ES" sz="900" dirty="0"/>
-                        <a:t>– </a:t>
-                      </a:r>
-                      <a:r>
-                        <a:rPr lang="es-ES" sz="900" dirty="0" err="1"/>
-                        <a:t>cantidadReservaciones</a:t>
-                      </a:r>
-                      <a:r>
-                        <a:rPr lang="es-ES" sz="900" dirty="0"/>
-                        <a:t>: </a:t>
-                      </a:r>
-                      <a:r>
-                        <a:rPr lang="es-ES" sz="900" dirty="0" err="1"/>
-                        <a:t>int</a:t>
-                      </a:r>
-                      <a:endParaRPr lang="es-ES" sz="900" dirty="0"/>
-                    </a:p>
-                    <a:p>
-                      <a:r>
-                        <a:rPr lang="es-ES" sz="900" dirty="0"/>
-                        <a:t>– </a:t>
-                      </a:r>
-                      <a:r>
-                        <a:rPr lang="es-ES" sz="900" dirty="0" err="1"/>
-                        <a:t>capacidadReservaciones</a:t>
-                      </a:r>
-                      <a:r>
-                        <a:rPr lang="es-ES" sz="900" dirty="0"/>
-                        <a:t>: </a:t>
-                      </a:r>
-                      <a:r>
-                        <a:rPr lang="es-ES" sz="900" dirty="0" err="1"/>
-                        <a:t>int</a:t>
-                      </a:r>
-                      <a:endParaRPr lang="en-CO" sz="900" dirty="0"/>
-                    </a:p>
-                  </a:txBody>
-                  <a:tcPr marL="68580" marR="68580" marT="34290" marB="34290"/>
-                </a:tc>
-                <a:extLst>
-                  <a:ext uri="{0D108BD9-81ED-4DB2-BD59-A6C34878D82A}">
-                    <a16:rowId xmlns:a16="http://schemas.microsoft.com/office/drawing/2014/main" val="2954312317"/>
-                  </a:ext>
-                </a:extLst>
-              </a:tr>
-              <a:tr h="1097280">
-                <a:tc>
-                  <a:txBody>
-                    <a:bodyPr/>
-                    <a:lstStyle/>
-                    <a:p>
-                      <a:r>
-                        <a:rPr lang="es-419" sz="900" dirty="0"/>
-                        <a:t>+ </a:t>
-                      </a:r>
-                      <a:r>
-                        <a:rPr lang="es-419" sz="900" dirty="0" err="1"/>
-                        <a:t>Huesped</a:t>
-                      </a:r>
-                      <a:r>
-                        <a:rPr lang="es-419" sz="900" dirty="0"/>
-                        <a:t>(documento: </a:t>
-                      </a:r>
-                      <a:r>
-                        <a:rPr lang="es-419" sz="900" dirty="0" err="1"/>
-                        <a:t>char</a:t>
-                      </a:r>
-                      <a:r>
-                        <a:rPr lang="es-419" sz="900" dirty="0"/>
-                        <a:t>*, nombre: </a:t>
-                      </a:r>
-                      <a:r>
-                        <a:rPr lang="es-419" sz="900" dirty="0" err="1"/>
-                        <a:t>char</a:t>
-                      </a:r>
-                      <a:r>
-                        <a:rPr lang="es-419" sz="900" dirty="0"/>
-                        <a:t>*, </a:t>
-                      </a:r>
-                      <a:r>
-                        <a:rPr lang="es-419" sz="900" dirty="0" err="1"/>
-                        <a:t>antiguedad</a:t>
-                      </a:r>
-                      <a:r>
-                        <a:rPr lang="es-419" sz="900" dirty="0"/>
-                        <a:t>: </a:t>
-                      </a:r>
-                      <a:r>
-                        <a:rPr lang="es-419" sz="900" dirty="0" err="1"/>
-                        <a:t>int</a:t>
-                      </a:r>
-                      <a:r>
-                        <a:rPr lang="es-419" sz="900" dirty="0"/>
-                        <a:t>)</a:t>
-                      </a:r>
-                    </a:p>
-                    <a:p>
-                      <a:r>
-                        <a:rPr lang="es-419" sz="900" dirty="0"/>
-                        <a:t>+ </a:t>
-                      </a:r>
-                      <a:r>
-                        <a:rPr lang="es-419" sz="900" dirty="0" err="1"/>
-                        <a:t>Huesped</a:t>
-                      </a:r>
-                      <a:r>
-                        <a:rPr lang="es-419" sz="900" dirty="0"/>
-                        <a:t>(</a:t>
-                      </a:r>
-                      <a:r>
-                        <a:rPr lang="es-419" sz="900" dirty="0" err="1"/>
-                        <a:t>const</a:t>
-                      </a:r>
-                      <a:r>
-                        <a:rPr lang="es-419" sz="900" dirty="0"/>
-                        <a:t> </a:t>
-                      </a:r>
-                      <a:r>
-                        <a:rPr lang="es-419" sz="900" dirty="0" err="1"/>
-                        <a:t>Huesped</a:t>
-                      </a:r>
-                      <a:r>
-                        <a:rPr lang="es-419" sz="900" dirty="0"/>
-                        <a:t>&amp; otro)</a:t>
-                      </a:r>
-                    </a:p>
-                    <a:p>
-                      <a:r>
-                        <a:rPr lang="es-419" sz="900" dirty="0"/>
-                        <a:t>+ ~</a:t>
-                      </a:r>
-                      <a:r>
-                        <a:rPr lang="es-419" sz="900" dirty="0" err="1"/>
-                        <a:t>Huesped</a:t>
-                      </a:r>
-                      <a:r>
-                        <a:rPr lang="es-419" sz="900" dirty="0"/>
-                        <a:t>()</a:t>
-                      </a:r>
-                    </a:p>
-                    <a:p>
-                      <a:r>
-                        <a:rPr lang="es-419" sz="900" dirty="0"/>
-                        <a:t>+ </a:t>
-                      </a:r>
-                      <a:r>
-                        <a:rPr lang="es-419" sz="900" dirty="0" err="1"/>
-                        <a:t>getDocumentoIdentidad</a:t>
-                      </a:r>
-                      <a:r>
-                        <a:rPr lang="es-419" sz="900" dirty="0"/>
-                        <a:t>(): </a:t>
-                      </a:r>
-                      <a:r>
-                        <a:rPr lang="es-419" sz="900" dirty="0" err="1"/>
-                        <a:t>char</a:t>
-                      </a:r>
-                      <a:r>
-                        <a:rPr lang="es-419" sz="900" dirty="0"/>
-                        <a:t>*</a:t>
-                      </a:r>
-                    </a:p>
-                    <a:p>
-                      <a:r>
-                        <a:rPr lang="es-419" sz="900" dirty="0"/>
-                        <a:t>+ </a:t>
-                      </a:r>
-                      <a:r>
-                        <a:rPr lang="es-419" sz="900" dirty="0" err="1"/>
-                        <a:t>getNombreCompleto</a:t>
-                      </a:r>
-                      <a:r>
-                        <a:rPr lang="es-419" sz="900" dirty="0"/>
-                        <a:t>(): </a:t>
-                      </a:r>
-                      <a:r>
-                        <a:rPr lang="es-419" sz="900" dirty="0" err="1"/>
-                        <a:t>char</a:t>
-                      </a:r>
-                      <a:r>
-                        <a:rPr lang="es-419" sz="900" dirty="0"/>
-                        <a:t>*</a:t>
-                      </a:r>
-                    </a:p>
-                    <a:p>
-                      <a:r>
-                        <a:rPr lang="es-419" sz="900" dirty="0"/>
-                        <a:t>+ </a:t>
-                      </a:r>
-                      <a:r>
-                        <a:rPr lang="es-419" sz="900" dirty="0" err="1"/>
-                        <a:t>setNombreCompleto</a:t>
-                      </a:r>
-                      <a:r>
-                        <a:rPr lang="es-419" sz="900" dirty="0"/>
-                        <a:t>(nombre: </a:t>
-                      </a:r>
-                      <a:r>
-                        <a:rPr lang="es-419" sz="900" dirty="0" err="1"/>
-                        <a:t>char</a:t>
-                      </a:r>
-                      <a:r>
-                        <a:rPr lang="es-419" sz="900" dirty="0"/>
-                        <a:t>*): </a:t>
-                      </a:r>
-                      <a:r>
-                        <a:rPr lang="es-419" sz="900" dirty="0" err="1"/>
-                        <a:t>void</a:t>
-                      </a:r>
-                      <a:endParaRPr lang="es-419" sz="900" dirty="0"/>
-                    </a:p>
-                    <a:p>
-                      <a:r>
-                        <a:rPr lang="es-419" sz="900" dirty="0"/>
-                        <a:t>+ </a:t>
-                      </a:r>
-                      <a:r>
-                        <a:rPr lang="es-419" sz="900" dirty="0" err="1"/>
-                        <a:t>getAntiguedadEnMeses</a:t>
-                      </a:r>
-                      <a:r>
-                        <a:rPr lang="es-419" sz="900" dirty="0"/>
-                        <a:t>(): </a:t>
-                      </a:r>
-                      <a:r>
-                        <a:rPr lang="es-419" sz="900" dirty="0" err="1"/>
-                        <a:t>int</a:t>
-                      </a:r>
-                      <a:endParaRPr lang="es-419" sz="900" dirty="0"/>
-                    </a:p>
-                    <a:p>
-                      <a:r>
-                        <a:rPr lang="es-419" sz="900" dirty="0"/>
-                        <a:t>+ </a:t>
-                      </a:r>
-                      <a:r>
-                        <a:rPr lang="es-419" sz="900" dirty="0" err="1"/>
-                        <a:t>getPuntuacion</a:t>
-                      </a:r>
-                      <a:r>
-                        <a:rPr lang="es-419" sz="900" dirty="0"/>
-                        <a:t>(): </a:t>
-                      </a:r>
-                      <a:r>
-                        <a:rPr lang="es-419" sz="900" dirty="0" err="1"/>
-                        <a:t>float</a:t>
-                      </a:r>
-                      <a:endParaRPr lang="es-419" sz="900" dirty="0"/>
-                    </a:p>
-                    <a:p>
-                      <a:r>
-                        <a:rPr lang="es-419" sz="900" dirty="0"/>
-                        <a:t>+ </a:t>
-                      </a:r>
-                      <a:r>
-                        <a:rPr lang="es-419" sz="900" dirty="0" err="1"/>
-                        <a:t>setPuntuacion</a:t>
-                      </a:r>
-                      <a:r>
-                        <a:rPr lang="es-419" sz="900" dirty="0"/>
-                        <a:t>(</a:t>
-                      </a:r>
-                      <a:r>
-                        <a:rPr lang="es-419" sz="900" dirty="0" err="1"/>
-                        <a:t>puntuacion</a:t>
-                      </a:r>
-                      <a:r>
-                        <a:rPr lang="es-419" sz="900" dirty="0"/>
-                        <a:t>: </a:t>
-                      </a:r>
-                      <a:r>
-                        <a:rPr lang="es-419" sz="900" dirty="0" err="1"/>
-                        <a:t>float</a:t>
-                      </a:r>
-                      <a:r>
-                        <a:rPr lang="es-419" sz="900" dirty="0"/>
-                        <a:t>): </a:t>
-                      </a:r>
-                      <a:r>
-                        <a:rPr lang="es-419" sz="900" dirty="0" err="1"/>
-                        <a:t>void</a:t>
-                      </a:r>
-                      <a:endParaRPr lang="es-419" sz="900" dirty="0"/>
-                    </a:p>
-                    <a:p>
-                      <a:r>
-                        <a:rPr lang="es-419" sz="900" dirty="0"/>
-                        <a:t>+ </a:t>
-                      </a:r>
-                      <a:r>
-                        <a:rPr lang="es-419" sz="900" dirty="0" err="1"/>
-                        <a:t>getCantidadReservaciones</a:t>
-                      </a:r>
-                      <a:r>
-                        <a:rPr lang="es-419" sz="900" dirty="0"/>
-                        <a:t>(): </a:t>
-                      </a:r>
-                      <a:r>
-                        <a:rPr lang="es-419" sz="900" dirty="0" err="1"/>
-                        <a:t>int</a:t>
-                      </a:r>
-                      <a:endParaRPr lang="es-419" sz="900" dirty="0"/>
-                    </a:p>
-                    <a:p>
-                      <a:r>
-                        <a:rPr lang="es-419" sz="900" dirty="0"/>
-                        <a:t>+ </a:t>
-                      </a:r>
-                      <a:r>
-                        <a:rPr lang="es-419" sz="900" dirty="0" err="1"/>
-                        <a:t>puedeReservar</a:t>
-                      </a:r>
-                      <a:r>
-                        <a:rPr lang="es-419" sz="900" dirty="0"/>
-                        <a:t>(</a:t>
-                      </a:r>
-                      <a:r>
-                        <a:rPr lang="es-419" sz="900" dirty="0" err="1"/>
-                        <a:t>fechaInicio</a:t>
-                      </a:r>
-                      <a:r>
-                        <a:rPr lang="es-419" sz="900" dirty="0"/>
-                        <a:t>: Fecha, </a:t>
-                      </a:r>
-                      <a:r>
-                        <a:rPr lang="es-419" sz="900" dirty="0" err="1"/>
-                        <a:t>duracion</a:t>
-                      </a:r>
-                      <a:r>
-                        <a:rPr lang="es-419" sz="900" dirty="0"/>
-                        <a:t>: </a:t>
-                      </a:r>
-                      <a:r>
-                        <a:rPr lang="es-419" sz="900" dirty="0" err="1"/>
-                        <a:t>int</a:t>
-                      </a:r>
-                      <a:r>
-                        <a:rPr lang="es-419" sz="900" dirty="0"/>
-                        <a:t>): </a:t>
-                      </a:r>
-                      <a:r>
-                        <a:rPr lang="es-419" sz="900" dirty="0" err="1"/>
-                        <a:t>bool</a:t>
-                      </a:r>
-                      <a:endParaRPr lang="es-419" sz="900" dirty="0"/>
-                    </a:p>
-                    <a:p>
-                      <a:r>
-                        <a:rPr lang="es-419" sz="900" dirty="0"/>
-                        <a:t>+ </a:t>
-                      </a:r>
-                      <a:r>
-                        <a:rPr lang="es-419" sz="900" dirty="0" err="1"/>
-                        <a:t>agregarReservacion</a:t>
-                      </a:r>
-                      <a:r>
-                        <a:rPr lang="es-419" sz="900" dirty="0"/>
-                        <a:t>(reserva: </a:t>
-                      </a:r>
-                      <a:r>
-                        <a:rPr lang="es-419" sz="900" dirty="0" err="1"/>
-                        <a:t>Reservacion</a:t>
-                      </a:r>
-                      <a:r>
-                        <a:rPr lang="es-419" sz="900" dirty="0"/>
-                        <a:t>*): </a:t>
-                      </a:r>
-                      <a:r>
-                        <a:rPr lang="es-419" sz="900" dirty="0" err="1"/>
-                        <a:t>void</a:t>
-                      </a:r>
-                      <a:endParaRPr lang="es-419" sz="900" dirty="0"/>
-                    </a:p>
-                    <a:p>
-                      <a:r>
-                        <a:rPr lang="es-419" sz="900" dirty="0"/>
-                        <a:t>+ </a:t>
-                      </a:r>
-                      <a:r>
-                        <a:rPr lang="es-419" sz="900" dirty="0" err="1"/>
-                        <a:t>anularReservacion</a:t>
-                      </a:r>
-                      <a:r>
-                        <a:rPr lang="es-419" sz="900" dirty="0"/>
-                        <a:t>(</a:t>
-                      </a:r>
-                      <a:r>
-                        <a:rPr lang="es-419" sz="900" dirty="0" err="1"/>
-                        <a:t>codigoReservacion</a:t>
-                      </a:r>
-                      <a:r>
-                        <a:rPr lang="es-419" sz="900" dirty="0"/>
-                        <a:t>: </a:t>
-                      </a:r>
-                      <a:r>
-                        <a:rPr lang="es-419" sz="900" dirty="0" err="1"/>
-                        <a:t>char</a:t>
-                      </a:r>
-                      <a:r>
-                        <a:rPr lang="es-419" sz="900" dirty="0"/>
-                        <a:t>*): </a:t>
-                      </a:r>
-                      <a:r>
-                        <a:rPr lang="es-419" sz="900" dirty="0" err="1"/>
-                        <a:t>void</a:t>
-                      </a:r>
-                      <a:endParaRPr lang="es-419" sz="900" dirty="0"/>
-                    </a:p>
-                    <a:p>
-                      <a:r>
-                        <a:rPr lang="es-419" sz="900" dirty="0"/>
-                        <a:t>+ </a:t>
-                      </a:r>
-                      <a:r>
-                        <a:rPr lang="es-419" sz="900" dirty="0" err="1"/>
-                        <a:t>consultarReservaciones</a:t>
-                      </a:r>
-                      <a:r>
-                        <a:rPr lang="es-419" sz="900" dirty="0"/>
-                        <a:t>(): </a:t>
-                      </a:r>
-                      <a:r>
-                        <a:rPr lang="es-419" sz="900" dirty="0" err="1"/>
-                        <a:t>void</a:t>
-                      </a:r>
-                      <a:endParaRPr lang="en-CO" sz="900" dirty="0"/>
                     </a:p>
                   </a:txBody>
                   <a:tcPr marL="68580" marR="68580" marT="34290" marB="34290"/>
@@ -4032,14 +3405,14 @@
           <p:nvPr>
             <p:extLst>
               <p:ext uri="{D42A27DB-BD31-4B8C-83A1-F6EECF244321}">
-                <p14:modId xmlns:p14="http://schemas.microsoft.com/office/powerpoint/2010/main" val="1481760568"/>
+                <p14:modId xmlns:p14="http://schemas.microsoft.com/office/powerpoint/2010/main" val="3691790209"/>
               </p:ext>
             </p:extLst>
           </p:nvPr>
         </p:nvGraphicFramePr>
         <p:xfrm>
-          <a:off x="817723" y="131121"/>
-          <a:ext cx="1865671" cy="4594860"/>
+          <a:off x="725788" y="61201"/>
+          <a:ext cx="1865671" cy="5554980"/>
         </p:xfrm>
         <a:graphic>
           <a:graphicData uri="http://schemas.openxmlformats.org/drawingml/2006/table">
@@ -4064,8 +3437,8 @@
                     <a:p>
                       <a:pPr algn="ctr"/>
                       <a:r>
-                        <a:rPr lang="es-419" sz="900" dirty="0" err="1"/>
-                        <a:t>Reservacion</a:t>
+                        <a:rPr lang="es-419" sz="900" dirty="0"/>
+                        <a:t>Reserva</a:t>
                       </a:r>
                       <a:endParaRPr lang="en-CO" sz="900" dirty="0"/>
                     </a:p>
@@ -4086,7 +3459,7 @@
                     <a:p>
                       <a:r>
                         <a:rPr lang="en-US" sz="900" dirty="0"/>
-                        <a:t>– </a:t>
+                        <a:t>- </a:t>
                       </a:r>
                       <a:r>
                         <a:rPr lang="en-US" sz="900" dirty="0" err="1"/>
@@ -4100,7 +3473,7 @@
                     <a:p>
                       <a:r>
                         <a:rPr lang="en-US" sz="900" dirty="0"/>
-                        <a:t>– </a:t>
+                        <a:t>- </a:t>
                       </a:r>
                       <a:r>
                         <a:rPr lang="en-US" sz="900" dirty="0" err="1"/>
@@ -4119,7 +3492,7 @@
                     <a:p>
                       <a:r>
                         <a:rPr lang="en-US" sz="900" dirty="0"/>
-                        <a:t>– </a:t>
+                        <a:t>- </a:t>
                       </a:r>
                       <a:r>
                         <a:rPr lang="en-US" sz="900" dirty="0" err="1"/>
@@ -4133,7 +3506,7 @@
                     <a:p>
                       <a:r>
                         <a:rPr lang="en-US" sz="900" dirty="0"/>
-                        <a:t>– </a:t>
+                        <a:t>- </a:t>
                       </a:r>
                       <a:r>
                         <a:rPr lang="en-US" sz="900" dirty="0" err="1"/>
@@ -4155,7 +3528,7 @@
                     <a:p>
                       <a:r>
                         <a:rPr lang="en-US" sz="900" dirty="0"/>
-                        <a:t>– </a:t>
+                        <a:t>- </a:t>
                       </a:r>
                       <a:r>
                         <a:rPr lang="en-US" sz="900" dirty="0" err="1"/>
@@ -4177,7 +3550,7 @@
                     <a:p>
                       <a:r>
                         <a:rPr lang="en-US" sz="900" dirty="0"/>
-                        <a:t>– </a:t>
+                        <a:t>- </a:t>
                       </a:r>
                       <a:r>
                         <a:rPr lang="en-US" sz="900" dirty="0" err="1"/>
@@ -4185,37 +3558,32 @@
                       </a:r>
                       <a:r>
                         <a:rPr lang="en-US" sz="900" dirty="0"/>
+                        <a:t>: int</a:t>
+                      </a:r>
+                    </a:p>
+                    <a:p>
+                      <a:r>
+                        <a:rPr lang="en-US" sz="900" dirty="0"/>
+                        <a:t>- </a:t>
+                      </a:r>
+                      <a:r>
+                        <a:rPr lang="en-US" sz="900" dirty="0" err="1"/>
+                        <a:t>fechaPago</a:t>
+                      </a:r>
+                      <a:r>
+                        <a:rPr lang="en-US" sz="900" dirty="0"/>
                         <a:t>: </a:t>
                       </a:r>
                       <a:r>
                         <a:rPr lang="en-US" sz="900" dirty="0" err="1"/>
-                        <a:t>MetodoPago</a:t>
+                        <a:t>Fecha</a:t>
                       </a:r>
                       <a:endParaRPr lang="en-US" sz="900" dirty="0"/>
                     </a:p>
                     <a:p>
                       <a:r>
                         <a:rPr lang="en-US" sz="900" dirty="0"/>
-                        <a:t>– </a:t>
-                      </a:r>
-                      <a:r>
-                        <a:rPr lang="en-US" sz="900" dirty="0" err="1"/>
-                        <a:t>fechaPago</a:t>
-                      </a:r>
-                      <a:r>
-                        <a:rPr lang="en-US" sz="900" dirty="0"/>
-                        <a:t>: </a:t>
-                      </a:r>
-                      <a:r>
-                        <a:rPr lang="en-US" sz="900" dirty="0" err="1"/>
-                        <a:t>Fecha</a:t>
-                      </a:r>
-                      <a:endParaRPr lang="en-US" sz="900" dirty="0"/>
-                    </a:p>
-                    <a:p>
-                      <a:r>
-                        <a:rPr lang="en-US" sz="900" dirty="0"/>
-                        <a:t>– </a:t>
+                        <a:t>- </a:t>
                       </a:r>
                       <a:r>
                         <a:rPr lang="en-US" sz="900" dirty="0" err="1"/>
@@ -4229,7 +3597,7 @@
                     <a:p>
                       <a:r>
                         <a:rPr lang="en-US" sz="900" dirty="0"/>
-                        <a:t>– </a:t>
+                        <a:t>- </a:t>
                       </a:r>
                       <a:r>
                         <a:rPr lang="en-US" sz="900" dirty="0" err="1"/>
@@ -4258,23 +3626,137 @@
                     <a:p>
                       <a:r>
                         <a:rPr lang="es-419" sz="900" dirty="0"/>
+                        <a:t>+ Reserva(</a:t>
+                      </a:r>
+                      <a:r>
+                        <a:rPr lang="es-419" sz="900" dirty="0" err="1"/>
+                        <a:t>codigo</a:t>
+                      </a:r>
+                      <a:r>
+                        <a:rPr lang="es-419" sz="900" dirty="0"/>
+                        <a:t>: </a:t>
+                      </a:r>
+                      <a:r>
+                        <a:rPr lang="es-419" sz="900" dirty="0" err="1"/>
+                        <a:t>char</a:t>
+                      </a:r>
+                      <a:r>
+                        <a:rPr lang="es-419" sz="900" dirty="0"/>
+                        <a:t>*, </a:t>
+                      </a:r>
+                      <a:r>
+                        <a:rPr lang="es-419" sz="900" dirty="0" err="1"/>
+                        <a:t>fechaEntrada</a:t>
+                      </a:r>
+                      <a:r>
+                        <a:rPr lang="es-419" sz="900" dirty="0"/>
+                        <a:t>: Fecha, </a:t>
+                      </a:r>
+                      <a:r>
+                        <a:rPr lang="es-419" sz="900" dirty="0" err="1"/>
+                        <a:t>duracion</a:t>
+                      </a:r>
+                      <a:r>
+                        <a:rPr lang="es-419" sz="900" dirty="0"/>
+                        <a:t>: </a:t>
+                      </a:r>
+                      <a:r>
+                        <a:rPr lang="es-419" sz="900" dirty="0" err="1"/>
+                        <a:t>int</a:t>
+                      </a:r>
+                      <a:r>
+                        <a:rPr lang="es-419" sz="900" dirty="0"/>
+                        <a:t>, alojamiento: Alojamiento*, </a:t>
+                      </a:r>
+                      <a:r>
+                        <a:rPr lang="es-419" sz="900" dirty="0" err="1"/>
+                        <a:t>huesped</a:t>
+                      </a:r>
+                      <a:r>
+                        <a:rPr lang="es-419" sz="900" dirty="0"/>
+                        <a:t>: </a:t>
+                      </a:r>
+                      <a:r>
+                        <a:rPr lang="es-419" sz="900" dirty="0" err="1"/>
+                        <a:t>Huesped</a:t>
+                      </a:r>
+                      <a:r>
+                        <a:rPr lang="es-419" sz="900" dirty="0"/>
+                        <a:t>*, </a:t>
+                      </a:r>
+                      <a:r>
+                        <a:rPr lang="es-419" sz="900" dirty="0" err="1"/>
+                        <a:t>metodoPago</a:t>
+                      </a:r>
+                      <a:r>
+                        <a:rPr lang="es-419" sz="900" dirty="0"/>
+                        <a:t>: </a:t>
+                      </a:r>
+                      <a:r>
+                        <a:rPr lang="es-419" sz="900" dirty="0" err="1"/>
+                        <a:t>int</a:t>
+                      </a:r>
+                      <a:r>
+                        <a:rPr lang="es-419" sz="900" dirty="0"/>
+                        <a:t>, </a:t>
+                      </a:r>
+                      <a:r>
+                        <a:rPr lang="es-419" sz="900" dirty="0" err="1"/>
+                        <a:t>fechaPago</a:t>
+                      </a:r>
+                      <a:r>
+                        <a:rPr lang="es-419" sz="900" dirty="0"/>
+                        <a:t>: Fecha, monto: </a:t>
+                      </a:r>
+                      <a:r>
+                        <a:rPr lang="es-419" sz="900" dirty="0" err="1"/>
+                        <a:t>double</a:t>
+                      </a:r>
+                      <a:r>
+                        <a:rPr lang="es-419" sz="900" dirty="0"/>
+                        <a:t>, anotaciones: </a:t>
+                      </a:r>
+                      <a:r>
+                        <a:rPr lang="es-419" sz="900" dirty="0" err="1"/>
+                        <a:t>char</a:t>
+                      </a:r>
+                      <a:r>
+                        <a:rPr lang="es-419" sz="900" dirty="0"/>
+                        <a:t>*)</a:t>
+                      </a:r>
+                    </a:p>
+                    <a:p>
+                      <a:r>
+                        <a:rPr lang="es-419" sz="900" dirty="0"/>
+                        <a:t>+ Reserva(</a:t>
+                      </a:r>
+                      <a:r>
+                        <a:rPr lang="es-419" sz="900" dirty="0" err="1"/>
+                        <a:t>const</a:t>
+                      </a:r>
+                      <a:r>
+                        <a:rPr lang="es-419" sz="900" dirty="0"/>
+                        <a:t> Reserva&amp; otra)</a:t>
+                      </a:r>
+                    </a:p>
+                    <a:p>
+                      <a:r>
+                        <a:rPr lang="es-419" sz="900" dirty="0"/>
+                        <a:t>+ ~Reserva()</a:t>
+                      </a:r>
+                    </a:p>
+                    <a:p>
+                      <a:r>
+                        <a:rPr lang="es-419" sz="900" dirty="0"/>
                         <a:t>+ </a:t>
                       </a:r>
                       <a:r>
                         <a:rPr lang="es-419" sz="900" dirty="0" err="1"/>
-                        <a:t>Reservacion</a:t>
-                      </a:r>
-                      <a:r>
-                        <a:rPr lang="es-419" sz="900" dirty="0"/>
-                        <a:t>(</a:t>
-                      </a:r>
-                      <a:r>
-                        <a:rPr lang="es-419" sz="900" dirty="0" err="1"/>
-                        <a:t>codigo</a:t>
-                      </a:r>
-                      <a:r>
-                        <a:rPr lang="es-419" sz="900" dirty="0"/>
-                        <a:t>: </a:t>
+                        <a:t>getCodigo</a:t>
+                      </a:r>
+                      <a:r>
+                        <a:rPr lang="es-419" sz="900" dirty="0"/>
+                        <a:t>(): </a:t>
                       </a:r>
                       <a:r>
                         <a:rPr lang="es-419" sz="900" dirty="0" err="1"/>
@@ -4282,39 +3764,68 @@
                       </a:r>
                       <a:r>
                         <a:rPr lang="es-419" sz="900" dirty="0"/>
-                        <a:t>*, </a:t>
-                      </a:r>
-                      <a:r>
-                        <a:rPr lang="es-419" sz="900" dirty="0" err="1"/>
-                        <a:t>fechaEntrada</a:t>
-                      </a:r>
-                      <a:r>
-                        <a:rPr lang="es-419" sz="900" dirty="0"/>
-                        <a:t>: Fecha, </a:t>
-                      </a:r>
-                      <a:r>
-                        <a:rPr lang="es-419" sz="900" dirty="0" err="1"/>
-                        <a:t>duracion</a:t>
-                      </a:r>
-                      <a:r>
-                        <a:rPr lang="es-419" sz="900" dirty="0"/>
-                        <a:t>: </a:t>
+                        <a:t>*</a:t>
+                      </a:r>
+                    </a:p>
+                    <a:p>
+                      <a:r>
+                        <a:rPr lang="es-419" sz="900" dirty="0"/>
+                        <a:t>+ </a:t>
+                      </a:r>
+                      <a:r>
+                        <a:rPr lang="es-419" sz="900" dirty="0" err="1"/>
+                        <a:t>getFechaEntrada</a:t>
+                      </a:r>
+                      <a:r>
+                        <a:rPr lang="es-419" sz="900" dirty="0"/>
+                        <a:t>(): Fecha</a:t>
+                      </a:r>
+                    </a:p>
+                    <a:p>
+                      <a:r>
+                        <a:rPr lang="es-419" sz="900" dirty="0"/>
+                        <a:t>+ </a:t>
+                      </a:r>
+                      <a:r>
+                        <a:rPr lang="es-419" sz="900" dirty="0" err="1"/>
+                        <a:t>getDuracionEnNoches</a:t>
+                      </a:r>
+                      <a:r>
+                        <a:rPr lang="es-419" sz="900" dirty="0"/>
+                        <a:t>(): </a:t>
                       </a:r>
                       <a:r>
                         <a:rPr lang="es-419" sz="900" dirty="0" err="1"/>
                         <a:t>int</a:t>
                       </a:r>
-                      <a:r>
-                        <a:rPr lang="es-419" sz="900" dirty="0"/>
-                        <a:t>, alojamiento: Alojamiento*, </a:t>
-                      </a:r>
-                      <a:r>
-                        <a:rPr lang="es-419" sz="900" dirty="0" err="1"/>
-                        <a:t>huesped</a:t>
-                      </a:r>
-                      <a:r>
-                        <a:rPr lang="es-419" sz="900" dirty="0"/>
-                        <a:t>: </a:t>
+                      <a:endParaRPr lang="es-419" sz="900" dirty="0"/>
+                    </a:p>
+                    <a:p>
+                      <a:r>
+                        <a:rPr lang="es-419" sz="900" dirty="0"/>
+                        <a:t>+ </a:t>
+                      </a:r>
+                      <a:r>
+                        <a:rPr lang="es-419" sz="900" dirty="0" err="1"/>
+                        <a:t>getAlojamientoReservado</a:t>
+                      </a:r>
+                      <a:r>
+                        <a:rPr lang="es-419" sz="900" dirty="0"/>
+                        <a:t>(): Alojamiento*</a:t>
+                      </a:r>
+                    </a:p>
+                    <a:p>
+                      <a:r>
+                        <a:rPr lang="es-419" sz="900" dirty="0"/>
+                        <a:t>+ </a:t>
+                      </a:r>
+                      <a:r>
+                        <a:rPr lang="es-419" sz="900" dirty="0" err="1"/>
+                        <a:t>getHuespedResponsable</a:t>
+                      </a:r>
+                      <a:r>
+                        <a:rPr lang="es-419" sz="900" dirty="0"/>
+                        <a:t>(): </a:t>
                       </a:r>
                       <a:r>
                         <a:rPr lang="es-419" sz="900" dirty="0" err="1"/>
@@ -4322,39 +3833,73 @@
                       </a:r>
                       <a:r>
                         <a:rPr lang="es-419" sz="900" dirty="0"/>
-                        <a:t>*, </a:t>
-                      </a:r>
-                      <a:r>
-                        <a:rPr lang="es-419" sz="900" dirty="0" err="1"/>
-                        <a:t>metodoPago</a:t>
-                      </a:r>
-                      <a:r>
-                        <a:rPr lang="es-419" sz="900" dirty="0"/>
-                        <a:t>: </a:t>
+                        <a:t>*</a:t>
+                      </a:r>
+                    </a:p>
+                    <a:p>
+                      <a:r>
+                        <a:rPr lang="es-419" sz="900" dirty="0"/>
+                        <a:t>+ </a:t>
+                      </a:r>
+                      <a:r>
+                        <a:rPr lang="es-419" sz="900" dirty="0" err="1"/>
+                        <a:t>getMetodoPago</a:t>
+                      </a:r>
+                      <a:r>
+                        <a:rPr lang="es-419" sz="900" dirty="0"/>
+                        <a:t>(): </a:t>
                       </a:r>
                       <a:r>
                         <a:rPr lang="es-419" sz="900" dirty="0" err="1"/>
                         <a:t>int</a:t>
                       </a:r>
-                      <a:r>
-                        <a:rPr lang="es-419" sz="900" dirty="0"/>
-                        <a:t>, </a:t>
-                      </a:r>
-                      <a:r>
-                        <a:rPr lang="es-419" sz="900" dirty="0" err="1"/>
-                        <a:t>fechaPago</a:t>
-                      </a:r>
-                      <a:r>
-                        <a:rPr lang="es-419" sz="900" dirty="0"/>
-                        <a:t>: Fecha, monto: </a:t>
+                      <a:endParaRPr lang="es-419" sz="900" dirty="0"/>
+                    </a:p>
+                    <a:p>
+                      <a:r>
+                        <a:rPr lang="es-419" sz="900" dirty="0"/>
+                        <a:t>+ </a:t>
+                      </a:r>
+                      <a:r>
+                        <a:rPr lang="es-419" sz="900" dirty="0" err="1"/>
+                        <a:t>getFechaPago</a:t>
+                      </a:r>
+                      <a:r>
+                        <a:rPr lang="es-419" sz="900" dirty="0"/>
+                        <a:t>(): Fecha</a:t>
+                      </a:r>
+                    </a:p>
+                    <a:p>
+                      <a:r>
+                        <a:rPr lang="es-419" sz="900" dirty="0"/>
+                        <a:t>+ </a:t>
+                      </a:r>
+                      <a:r>
+                        <a:rPr lang="es-419" sz="900" dirty="0" err="1"/>
+                        <a:t>getMontoPagado</a:t>
+                      </a:r>
+                      <a:r>
+                        <a:rPr lang="es-419" sz="900" dirty="0"/>
+                        <a:t>(): </a:t>
                       </a:r>
                       <a:r>
                         <a:rPr lang="es-419" sz="900" dirty="0" err="1"/>
                         <a:t>double</a:t>
                       </a:r>
-                      <a:r>
-                        <a:rPr lang="es-419" sz="900" dirty="0"/>
-                        <a:t>, anotaciones: </a:t>
+                      <a:endParaRPr lang="es-419" sz="900" dirty="0"/>
+                    </a:p>
+                    <a:p>
+                      <a:r>
+                        <a:rPr lang="es-419" sz="900" dirty="0"/>
+                        <a:t>+ </a:t>
+                      </a:r>
+                      <a:r>
+                        <a:rPr lang="es-419" sz="900" dirty="0" err="1"/>
+                        <a:t>getAnotaciones</a:t>
+                      </a:r>
+                      <a:r>
+                        <a:rPr lang="es-419" sz="900" dirty="0"/>
+                        <a:t>(): </a:t>
                       </a:r>
                       <a:r>
                         <a:rPr lang="es-419" sz="900" dirty="0" err="1"/>
@@ -4362,7 +3907,7 @@
                       </a:r>
                       <a:r>
                         <a:rPr lang="es-419" sz="900" dirty="0"/>
-                        <a:t>*)</a:t>
+                        <a:t>*</a:t>
                       </a:r>
                     </a:p>
                     <a:p>
@@ -4372,41 +3917,11 @@
                       </a:r>
                       <a:r>
                         <a:rPr lang="es-419" sz="900" dirty="0" err="1"/>
-                        <a:t>Reservacion</a:t>
-                      </a:r>
-                      <a:r>
-                        <a:rPr lang="es-419" sz="900" dirty="0"/>
-                        <a:t>(</a:t>
-                      </a:r>
-                      <a:r>
-                        <a:rPr lang="es-419" sz="900" dirty="0" err="1"/>
-                        <a:t>const</a:t>
-                      </a:r>
-                      <a:r>
-                        <a:rPr lang="es-419" sz="900" dirty="0"/>
-                        <a:t> </a:t>
-                      </a:r>
-                      <a:r>
-                        <a:rPr lang="es-419" sz="900" dirty="0" err="1"/>
-                        <a:t>Reservacion</a:t>
-                      </a:r>
-                      <a:r>
-                        <a:rPr lang="es-419" sz="900" dirty="0"/>
-                        <a:t>&amp; otra)</a:t>
-                      </a:r>
-                    </a:p>
-                    <a:p>
-                      <a:r>
-                        <a:rPr lang="es-419" sz="900" dirty="0"/>
-                        <a:t>+ ~</a:t>
-                      </a:r>
-                      <a:r>
-                        <a:rPr lang="es-419" sz="900" dirty="0" err="1"/>
-                        <a:t>Reservacion</a:t>
-                      </a:r>
-                      <a:r>
-                        <a:rPr lang="es-419" sz="900" dirty="0"/>
-                        <a:t>()</a:t>
+                        <a:t>calcularFechaSalida</a:t>
+                      </a:r>
+                      <a:r>
+                        <a:rPr lang="es-419" sz="900" dirty="0"/>
+                        <a:t>(): Fecha</a:t>
                       </a:r>
                     </a:p>
                     <a:p>
@@ -4416,7 +3931,7 @@
                       </a:r>
                       <a:r>
                         <a:rPr lang="es-419" sz="900" dirty="0" err="1"/>
-                        <a:t>getCodigo</a:t>
+                        <a:t>mostrarComprobante</a:t>
                       </a:r>
                       <a:r>
                         <a:rPr lang="es-419" sz="900" dirty="0"/>
@@ -4424,188 +3939,39 @@
                       </a:r>
                       <a:r>
                         <a:rPr lang="es-419" sz="900" dirty="0" err="1"/>
-                        <a:t>char</a:t>
-                      </a:r>
-                      <a:r>
-                        <a:rPr lang="es-419" sz="900" dirty="0"/>
-                        <a:t>*</a:t>
-                      </a:r>
-                    </a:p>
-                    <a:p>
-                      <a:r>
-                        <a:rPr lang="es-419" sz="900" dirty="0"/>
-                        <a:t>+ </a:t>
-                      </a:r>
-                      <a:r>
-                        <a:rPr lang="es-419" sz="900" dirty="0" err="1"/>
-                        <a:t>getFechaEntrada</a:t>
-                      </a:r>
-                      <a:r>
-                        <a:rPr lang="es-419" sz="900" dirty="0"/>
-                        <a:t>(): Fecha</a:t>
-                      </a:r>
-                    </a:p>
-                    <a:p>
-                      <a:r>
-                        <a:rPr lang="es-419" sz="900" dirty="0"/>
-                        <a:t>+ </a:t>
-                      </a:r>
-                      <a:r>
-                        <a:rPr lang="es-419" sz="900" dirty="0" err="1"/>
-                        <a:t>getDuracionEnNoches</a:t>
-                      </a:r>
-                      <a:r>
-                        <a:rPr lang="es-419" sz="900" dirty="0"/>
-                        <a:t>(): </a:t>
-                      </a:r>
-                      <a:r>
-                        <a:rPr lang="es-419" sz="900" dirty="0" err="1"/>
-                        <a:t>int</a:t>
+                        <a:t>void</a:t>
                       </a:r>
                       <a:endParaRPr lang="es-419" sz="900" dirty="0"/>
                     </a:p>
                     <a:p>
                       <a:r>
-                        <a:rPr lang="es-419" sz="900" dirty="0"/>
-                        <a:t>+ </a:t>
-                      </a:r>
-                      <a:r>
-                        <a:rPr lang="es-419" sz="900" dirty="0" err="1"/>
-                        <a:t>getAlojamientoReservado</a:t>
-                      </a:r>
-                      <a:r>
-                        <a:rPr lang="es-419" sz="900" dirty="0"/>
-                        <a:t>(): Alojamiento*</a:t>
-                      </a:r>
-                    </a:p>
-                    <a:p>
-                      <a:r>
-                        <a:rPr lang="es-419" sz="900" dirty="0"/>
-                        <a:t>+ </a:t>
-                      </a:r>
-                      <a:r>
-                        <a:rPr lang="es-419" sz="900" dirty="0" err="1"/>
-                        <a:t>getHuespedResponsable</a:t>
-                      </a:r>
-                      <a:r>
-                        <a:rPr lang="es-419" sz="900" dirty="0"/>
-                        <a:t>(): </a:t>
-                      </a:r>
-                      <a:r>
-                        <a:rPr lang="es-419" sz="900" dirty="0" err="1"/>
-                        <a:t>Huesped</a:t>
-                      </a:r>
-                      <a:r>
-                        <a:rPr lang="es-419" sz="900" dirty="0"/>
-                        <a:t>*</a:t>
-                      </a:r>
-                    </a:p>
-                    <a:p>
-                      <a:r>
-                        <a:rPr lang="es-419" sz="900" dirty="0"/>
-                        <a:t>+ </a:t>
-                      </a:r>
-                      <a:r>
-                        <a:rPr lang="es-419" sz="900" dirty="0" err="1"/>
-                        <a:t>getMetodoPago</a:t>
-                      </a:r>
-                      <a:r>
-                        <a:rPr lang="es-419" sz="900" dirty="0"/>
-                        <a:t>(): </a:t>
-                      </a:r>
-                      <a:r>
-                        <a:rPr lang="es-419" sz="900" dirty="0" err="1"/>
-                        <a:t>int</a:t>
-                      </a:r>
-                      <a:endParaRPr lang="es-419" sz="900" dirty="0"/>
-                    </a:p>
-                    <a:p>
-                      <a:r>
-                        <a:rPr lang="es-419" sz="900" dirty="0"/>
-                        <a:t>+ </a:t>
-                      </a:r>
-                      <a:r>
-                        <a:rPr lang="es-419" sz="900" dirty="0" err="1"/>
-                        <a:t>getFechaPago</a:t>
-                      </a:r>
-                      <a:r>
-                        <a:rPr lang="es-419" sz="900" dirty="0"/>
-                        <a:t>(): Fecha</a:t>
-                      </a:r>
-                    </a:p>
-                    <a:p>
-                      <a:r>
-                        <a:rPr lang="es-419" sz="900" dirty="0"/>
-                        <a:t>+ </a:t>
-                      </a:r>
-                      <a:r>
-                        <a:rPr lang="es-419" sz="900" dirty="0" err="1"/>
-                        <a:t>getMontoPagado</a:t>
-                      </a:r>
-                      <a:r>
-                        <a:rPr lang="es-419" sz="900" dirty="0"/>
-                        <a:t>(): </a:t>
-                      </a:r>
-                      <a:r>
-                        <a:rPr lang="es-419" sz="900" dirty="0" err="1"/>
-                        <a:t>double</a:t>
-                      </a:r>
-                      <a:endParaRPr lang="es-419" sz="900" dirty="0"/>
-                    </a:p>
-                    <a:p>
-                      <a:r>
-                        <a:rPr lang="es-419" sz="900" dirty="0"/>
-                        <a:t>+ </a:t>
-                      </a:r>
-                      <a:r>
-                        <a:rPr lang="es-419" sz="900" dirty="0" err="1"/>
-                        <a:t>getAnotaciones</a:t>
-                      </a:r>
-                      <a:r>
-                        <a:rPr lang="es-419" sz="900" dirty="0"/>
-                        <a:t>(): </a:t>
-                      </a:r>
-                      <a:r>
-                        <a:rPr lang="es-419" sz="900" dirty="0" err="1"/>
-                        <a:t>char</a:t>
-                      </a:r>
-                      <a:r>
-                        <a:rPr lang="es-419" sz="900" dirty="0"/>
-                        <a:t>*</a:t>
-                      </a:r>
-                    </a:p>
-                    <a:p>
-                      <a:r>
-                        <a:rPr lang="es-419" sz="900" dirty="0"/>
-                        <a:t>+ </a:t>
-                      </a:r>
-                      <a:r>
-                        <a:rPr lang="es-419" sz="900" dirty="0" err="1"/>
-                        <a:t>calcularFechaSalida</a:t>
-                      </a:r>
-                      <a:r>
-                        <a:rPr lang="es-419" sz="900" dirty="0"/>
-                        <a:t>(): Fecha</a:t>
-                      </a:r>
-                    </a:p>
-                    <a:p>
-                      <a:r>
-                        <a:rPr lang="es-419" sz="900" dirty="0"/>
-                        <a:t>+ </a:t>
-                      </a:r>
-                      <a:r>
-                        <a:rPr lang="es-419" sz="900" dirty="0" err="1"/>
-                        <a:t>mostrarComprobante</a:t>
-                      </a:r>
-                      <a:r>
-                        <a:rPr lang="es-419" sz="900" dirty="0"/>
-                        <a:t>(): </a:t>
-                      </a:r>
-                      <a:r>
-                        <a:rPr lang="es-419" sz="900" dirty="0" err="1"/>
-                        <a:t>void</a:t>
-                      </a:r>
-                      <a:endParaRPr lang="en-CO" sz="900" dirty="0"/>
+                        <a:rPr lang="en-CO" sz="900" dirty="0"/>
+                        <a:t>- bool validarFechaEntrada(Fecha entrada)</a:t>
+                      </a:r>
+                    </a:p>
+                    <a:p>
+                      <a:r>
+                        <a:rPr lang="en-CO" sz="900" dirty="0"/>
+                        <a:t>- bool validarDuracion(int noches)</a:t>
+                      </a:r>
+                    </a:p>
+                    <a:p>
+                      <a:r>
+                        <a:rPr lang="en-CO" sz="900" dirty="0"/>
+                        <a:t>- bool validarMetodoPago(int metodo)</a:t>
+                      </a:r>
+                    </a:p>
+                    <a:p>
+                      <a:r>
+                        <a:rPr lang="en-CO" sz="900" dirty="0"/>
+                        <a:t>- bool validarMonto(double monto)</a:t>
+                      </a:r>
+                    </a:p>
+                    <a:p>
+                      <a:r>
+                        <a:rPr lang="en-CO" sz="900" dirty="0"/>
+                        <a:t>- bool validarAnotaciones(char* texto)</a:t>
+                      </a:r>
                     </a:p>
                   </a:txBody>
                   <a:tcPr marL="68580" marR="68580" marT="34290" marB="34290"/>
@@ -4678,14 +4044,14 @@
           <p:nvPr>
             <p:extLst>
               <p:ext uri="{D42A27DB-BD31-4B8C-83A1-F6EECF244321}">
-                <p14:modId xmlns:p14="http://schemas.microsoft.com/office/powerpoint/2010/main" val="86187885"/>
+                <p14:modId xmlns:p14="http://schemas.microsoft.com/office/powerpoint/2010/main" val="1974979576"/>
               </p:ext>
             </p:extLst>
           </p:nvPr>
         </p:nvGraphicFramePr>
         <p:xfrm>
-          <a:off x="3429223" y="3067983"/>
-          <a:ext cx="2388550" cy="5829300"/>
+          <a:off x="3447743" y="2342989"/>
+          <a:ext cx="2388550" cy="6652260"/>
         </p:xfrm>
         <a:graphic>
           <a:graphicData uri="http://schemas.openxmlformats.org/drawingml/2006/table">
@@ -4732,7 +4098,7 @@
                     <a:p>
                       <a:r>
                         <a:rPr lang="en-US" sz="900" dirty="0"/>
-                        <a:t>– </a:t>
+                        <a:t>- </a:t>
                       </a:r>
                       <a:r>
                         <a:rPr lang="en-US" sz="900" dirty="0" err="1"/>
@@ -4754,7 +4120,7 @@
                     <a:p>
                       <a:r>
                         <a:rPr lang="en-US" sz="900" dirty="0"/>
-                        <a:t>– </a:t>
+                        <a:t>- </a:t>
                       </a:r>
                       <a:r>
                         <a:rPr lang="en-US" sz="900" dirty="0" err="1"/>
@@ -4776,7 +4142,7 @@
                     <a:p>
                       <a:r>
                         <a:rPr lang="en-US" sz="900" dirty="0"/>
-                        <a:t>– </a:t>
+                        <a:t>- </a:t>
                       </a:r>
                       <a:r>
                         <a:rPr lang="en-US" sz="900" dirty="0" err="1"/>
@@ -4798,11 +4164,11 @@
                     <a:p>
                       <a:r>
                         <a:rPr lang="en-US" sz="900" dirty="0"/>
-                        <a:t>– </a:t>
-                      </a:r>
-                      <a:r>
-                        <a:rPr lang="en-US" sz="900" dirty="0" err="1"/>
-                        <a:t>listaReservacionesVigentes</a:t>
+                        <a:t>- </a:t>
+                      </a:r>
+                      <a:r>
+                        <a:rPr lang="en-US" sz="900" dirty="0" err="1"/>
+                        <a:t>listaReservasVigentes</a:t>
                       </a:r>
                       <a:r>
                         <a:rPr lang="en-US" sz="900" dirty="0"/>
@@ -4810,7 +4176,7 @@
                       </a:r>
                       <a:r>
                         <a:rPr lang="en-US" sz="900" dirty="0" err="1"/>
-                        <a:t>Reservacion</a:t>
+                        <a:t>Reserva</a:t>
                       </a:r>
                       <a:r>
                         <a:rPr lang="en-US" sz="900" dirty="0"/>
@@ -4820,11 +4186,11 @@
                     <a:p>
                       <a:r>
                         <a:rPr lang="en-US" sz="900" dirty="0"/>
-                        <a:t>– </a:t>
-                      </a:r>
-                      <a:r>
-                        <a:rPr lang="en-US" sz="900" dirty="0" err="1"/>
-                        <a:t>listaReservacionesHistoricas</a:t>
+                        <a:t>- </a:t>
+                      </a:r>
+                      <a:r>
+                        <a:rPr lang="en-US" sz="900" dirty="0" err="1"/>
+                        <a:t>listaReservasHistoricas</a:t>
                       </a:r>
                       <a:r>
                         <a:rPr lang="en-US" sz="900" dirty="0"/>
@@ -4832,7 +4198,7 @@
                       </a:r>
                       <a:r>
                         <a:rPr lang="en-US" sz="900" dirty="0" err="1"/>
-                        <a:t>Reservacion</a:t>
+                        <a:t>Reserva</a:t>
                       </a:r>
                       <a:r>
                         <a:rPr lang="en-US" sz="900" dirty="0"/>
@@ -4842,7 +4208,7 @@
                     <a:p>
                       <a:r>
                         <a:rPr lang="en-US" sz="900" dirty="0"/>
-                        <a:t>– </a:t>
+                        <a:t>- </a:t>
                       </a:r>
                       <a:r>
                         <a:rPr lang="en-US" sz="900" dirty="0" err="1"/>
@@ -4861,7 +4227,7 @@
                     <a:p>
                       <a:r>
                         <a:rPr lang="en-US" sz="900" dirty="0"/>
-                        <a:t>– </a:t>
+                        <a:t>- </a:t>
                       </a:r>
                       <a:r>
                         <a:rPr lang="en-US" sz="900" dirty="0" err="1"/>
@@ -4875,7 +4241,7 @@
                     <a:p>
                       <a:r>
                         <a:rPr lang="en-US" sz="900" dirty="0"/>
-                        <a:t>– </a:t>
+                        <a:t>- </a:t>
                       </a:r>
                       <a:r>
                         <a:rPr lang="en-US" sz="900" dirty="0" err="1"/>
@@ -4889,7 +4255,7 @@
                     <a:p>
                       <a:r>
                         <a:rPr lang="en-US" sz="900" dirty="0"/>
-                        <a:t>– </a:t>
+                        <a:t>- </a:t>
                       </a:r>
                       <a:r>
                         <a:rPr lang="en-US" sz="900" dirty="0" err="1"/>
@@ -4903,7 +4269,7 @@
                     <a:p>
                       <a:r>
                         <a:rPr lang="en-US" sz="900" dirty="0"/>
-                        <a:t>– </a:t>
+                        <a:t>- </a:t>
                       </a:r>
                       <a:r>
                         <a:rPr lang="en-US" sz="900" dirty="0" err="1"/>
@@ -4917,7 +4283,7 @@
                     <a:p>
                       <a:r>
                         <a:rPr lang="en-US" sz="900" dirty="0"/>
-                        <a:t>– </a:t>
+                        <a:t>- </a:t>
                       </a:r>
                       <a:r>
                         <a:rPr lang="en-US" sz="900" dirty="0" err="1"/>
@@ -4931,7 +4297,7 @@
                     <a:p>
                       <a:r>
                         <a:rPr lang="en-US" sz="900" dirty="0"/>
-                        <a:t>– </a:t>
+                        <a:t>- </a:t>
                       </a:r>
                       <a:r>
                         <a:rPr lang="en-US" sz="900" dirty="0" err="1"/>
@@ -4945,11 +4311,11 @@
                     <a:p>
                       <a:r>
                         <a:rPr lang="en-US" sz="900" dirty="0"/>
-                        <a:t>– </a:t>
-                      </a:r>
-                      <a:r>
-                        <a:rPr lang="en-US" sz="900" dirty="0" err="1"/>
-                        <a:t>cantidadReservacionesVigentes</a:t>
+                        <a:t>- </a:t>
+                      </a:r>
+                      <a:r>
+                        <a:rPr lang="en-US" sz="900" dirty="0" err="1"/>
+                        <a:t>cantidadReservasVigentes</a:t>
                       </a:r>
                       <a:r>
                         <a:rPr lang="en-US" sz="900" dirty="0"/>
@@ -4959,11 +4325,11 @@
                     <a:p>
                       <a:r>
                         <a:rPr lang="en-US" sz="900" dirty="0"/>
-                        <a:t>– </a:t>
-                      </a:r>
-                      <a:r>
-                        <a:rPr lang="en-US" sz="900" dirty="0" err="1"/>
-                        <a:t>capacidadReservacionesVigentes</a:t>
+                        <a:t>- </a:t>
+                      </a:r>
+                      <a:r>
+                        <a:rPr lang="en-US" sz="900" dirty="0" err="1"/>
+                        <a:t>capacidadReservasVigentes</a:t>
                       </a:r>
                       <a:r>
                         <a:rPr lang="en-US" sz="900" dirty="0"/>
@@ -4973,11 +4339,11 @@
                     <a:p>
                       <a:r>
                         <a:rPr lang="en-US" sz="900" dirty="0"/>
-                        <a:t>– </a:t>
-                      </a:r>
-                      <a:r>
-                        <a:rPr lang="en-US" sz="900" dirty="0" err="1"/>
-                        <a:t>cantidadReservacionesHistoricas</a:t>
+                        <a:t>- </a:t>
+                      </a:r>
+                      <a:r>
+                        <a:rPr lang="en-US" sz="900" dirty="0" err="1"/>
+                        <a:t>cantidadReservasHistoricas</a:t>
                       </a:r>
                       <a:r>
                         <a:rPr lang="en-US" sz="900" dirty="0"/>
@@ -4987,11 +4353,11 @@
                     <a:p>
                       <a:r>
                         <a:rPr lang="en-US" sz="900" dirty="0"/>
-                        <a:t>– </a:t>
-                      </a:r>
-                      <a:r>
-                        <a:rPr lang="en-US" sz="900" dirty="0" err="1"/>
-                        <a:t>capacidadReservacionesHistoricas</a:t>
+                        <a:t>- </a:t>
+                      </a:r>
+                      <a:r>
+                        <a:rPr lang="en-US" sz="900" dirty="0" err="1"/>
+                        <a:t>capacidadReservasHistoricas</a:t>
                       </a:r>
                       <a:r>
                         <a:rPr lang="en-US" sz="900" dirty="0"/>
@@ -5015,440 +4381,285 @@
                     <a:lstStyle/>
                     <a:p>
                       <a:r>
-                        <a:rPr lang="es-419" sz="900" dirty="0"/>
-                        <a:t>+ </a:t>
-                      </a:r>
-                      <a:r>
-                        <a:rPr lang="es-419" sz="900" dirty="0" err="1"/>
-                        <a:t>UdeAStay</a:t>
-                      </a:r>
-                      <a:r>
-                        <a:rPr lang="es-419" sz="900" dirty="0"/>
+                        <a:rPr lang="en-CO" sz="900" dirty="0"/>
+                        <a:t>+ UdeAStay()</a:t>
+                      </a:r>
+                    </a:p>
+                    <a:p>
+                      <a:r>
+                        <a:rPr lang="en-CO" sz="900" dirty="0"/>
+                        <a:t>+ ~UdeAStay()</a:t>
+                      </a:r>
+                    </a:p>
+                    <a:p>
+                      <a:r>
+                        <a:rPr lang="en-CO" sz="900" dirty="0"/>
+                        <a:t>+ iniciarSesion(documentoIdentidad: char*, tipoUsuario: int): void</a:t>
+                      </a:r>
+                    </a:p>
+                    <a:p>
+                      <a:r>
+                        <a:rPr lang="en-CO" sz="900" dirty="0"/>
+                        <a:t>+ buscarAlojamiento(fechaInicio: Fecha, municipio: char*, duracion: int, precioMaximo: double, puntuacionMinima: float): void</a:t>
+                      </a:r>
+                    </a:p>
+                    <a:p>
+                      <a:r>
+                        <a:rPr lang="en-CO" sz="900" dirty="0"/>
+                        <a:t>+ crearReserva(documentoHuesped: char*, codigoAlojamiento: char*, fechaEntrada: Fecha, duracion: int, metodoPago: int, monto: double, anotaciones: char*): void</a:t>
+                      </a:r>
+                    </a:p>
+                    <a:p>
+                      <a:r>
+                        <a:rPr lang="en-CO" sz="900" dirty="0"/>
+                        <a:t>+ anularReserva(codigoReserva: char*): void</a:t>
+                      </a:r>
+                    </a:p>
+                    <a:p>
+                      <a:r>
+                        <a:rPr lang="en-CO" sz="900" dirty="0"/>
+                        <a:t>+consultarReservasAnfitrion(documentoAnfitrion: char*, fechaDesde: Fecha, fechaHasta: Fecha): void</a:t>
+                      </a:r>
+                    </a:p>
+                    <a:p>
+                      <a:r>
+                        <a:rPr lang="en-CO" sz="900" dirty="0"/>
+                        <a:t>+actualizarReservasHistoricas(nuevaFechaCorte: Fecha): void</a:t>
+                      </a:r>
+                    </a:p>
+                    <a:p>
+                      <a:r>
+                        <a:rPr lang="en-CO" sz="900" dirty="0"/>
+                        <a:t>+ medirConsumoDeRecursos(): void</a:t>
+                      </a:r>
+                    </a:p>
+                    <a:p>
+                      <a:r>
+                        <a:rPr lang="en-CO" sz="900" dirty="0"/>
+                        <a:t>+ cargarDatosDesdeArchivo(): void</a:t>
+                      </a:r>
+                    </a:p>
+                    <a:p>
+                      <a:r>
+                        <a:rPr lang="en-CO" sz="900" dirty="0"/>
+                        <a:t>+ guardarDatosEnArchivo(): void</a:t>
+                      </a:r>
+                      <a:br>
+                        <a:rPr lang="en-US" sz="900" dirty="0"/>
+                      </a:br>
+                      <a:r>
+                        <a:rPr lang="en-US" sz="900" dirty="0"/>
+                        <a:t>- int </a:t>
+                      </a:r>
+                      <a:r>
+                        <a:rPr lang="en-US" sz="900" dirty="0" err="1"/>
+                        <a:t>buscarHuesped</a:t>
+                      </a:r>
+                      <a:r>
+                        <a:rPr lang="en-US" sz="900" dirty="0"/>
+                        <a:t>(char* </a:t>
+                      </a:r>
+                      <a:r>
+                        <a:rPr lang="en-US" sz="900" dirty="0" err="1"/>
+                        <a:t>documento</a:t>
+                      </a:r>
+                      <a:r>
+                        <a:rPr lang="en-US" sz="900" dirty="0"/>
+                        <a:t>)</a:t>
+                      </a:r>
+                    </a:p>
+                    <a:p>
+                      <a:r>
+                        <a:rPr lang="en-US" sz="900" dirty="0"/>
+                        <a:t>- int </a:t>
+                      </a:r>
+                      <a:r>
+                        <a:rPr lang="en-US" sz="900" dirty="0" err="1"/>
+                        <a:t>buscarAlojamiento</a:t>
+                      </a:r>
+                      <a:r>
+                        <a:rPr lang="en-US" sz="900" dirty="0"/>
+                        <a:t>(char* </a:t>
+                      </a:r>
+                      <a:r>
+                        <a:rPr lang="en-US" sz="900" dirty="0" err="1"/>
+                        <a:t>codigo</a:t>
+                      </a:r>
+                      <a:r>
+                        <a:rPr lang="en-US" sz="900" dirty="0"/>
+                        <a:t>)</a:t>
+                      </a:r>
+                    </a:p>
+                    <a:p>
+                      <a:r>
+                        <a:rPr lang="en-US" sz="900" dirty="0"/>
+                        <a:t>- int </a:t>
+                      </a:r>
+                      <a:r>
+                        <a:rPr lang="en-US" sz="900" dirty="0" err="1"/>
+                        <a:t>buscarAnfitrion</a:t>
+                      </a:r>
+                      <a:r>
+                        <a:rPr lang="en-US" sz="900" dirty="0"/>
+                        <a:t>(char* </a:t>
+                      </a:r>
+                      <a:r>
+                        <a:rPr lang="en-US" sz="900" dirty="0" err="1"/>
+                        <a:t>documento</a:t>
+                      </a:r>
+                      <a:r>
+                        <a:rPr lang="en-US" sz="900" dirty="0"/>
+                        <a:t>)</a:t>
+                      </a:r>
+                    </a:p>
+                    <a:p>
+                      <a:r>
+                        <a:rPr lang="en-US" sz="900" dirty="0"/>
+                        <a:t>- </a:t>
+                      </a:r>
+                      <a:r>
+                        <a:rPr lang="en-US" sz="900" dirty="0" err="1"/>
+                        <a:t>Reserva</a:t>
+                      </a:r>
+                      <a:r>
+                        <a:rPr lang="en-US" sz="900" dirty="0"/>
+                        <a:t>* </a:t>
+                      </a:r>
+                      <a:r>
+                        <a:rPr lang="en-US" sz="900" dirty="0" err="1"/>
+                        <a:t>buscarReserva</a:t>
+                      </a:r>
+                      <a:r>
+                        <a:rPr lang="en-US" sz="900" dirty="0"/>
+                        <a:t>(char* </a:t>
+                      </a:r>
+                      <a:r>
+                        <a:rPr lang="en-US" sz="900" dirty="0" err="1"/>
+                        <a:t>codigo</a:t>
+                      </a:r>
+                      <a:r>
+                        <a:rPr lang="en-US" sz="900" dirty="0"/>
+                        <a:t>)</a:t>
+                      </a:r>
+                    </a:p>
+                    <a:p>
+                      <a:r>
+                        <a:rPr lang="en-US" sz="900" dirty="0"/>
+                        <a:t>- char* </a:t>
+                      </a:r>
+                      <a:r>
+                        <a:rPr lang="en-US" sz="900" dirty="0" err="1"/>
+                        <a:t>generarCodigoReserva</a:t>
+                      </a:r>
+                      <a:r>
+                        <a:rPr lang="en-US" sz="900" dirty="0"/>
                         <a:t>()</a:t>
                       </a:r>
                     </a:p>
                     <a:p>
                       <a:r>
-                        <a:rPr lang="es-419" sz="900" dirty="0"/>
-                        <a:t>+ ~</a:t>
-                      </a:r>
-                      <a:r>
-                        <a:rPr lang="es-419" sz="900" dirty="0" err="1"/>
-                        <a:t>UdeAStay</a:t>
-                      </a:r>
-                      <a:r>
-                        <a:rPr lang="es-419" sz="900" dirty="0"/>
+                        <a:rPr lang="en-US" sz="900" dirty="0"/>
+                        <a:t>- </a:t>
+                      </a:r>
+                      <a:r>
+                        <a:rPr lang="en-US" sz="900" dirty="0" err="1"/>
+                        <a:t>Fecha</a:t>
+                      </a:r>
+                      <a:r>
+                        <a:rPr lang="en-US" sz="900" dirty="0"/>
+                        <a:t> </a:t>
+                      </a:r>
+                      <a:r>
+                        <a:rPr lang="en-US" sz="900" dirty="0" err="1"/>
+                        <a:t>sumarDias</a:t>
+                      </a:r>
+                      <a:r>
+                        <a:rPr lang="en-US" sz="900" dirty="0"/>
+                        <a:t>(</a:t>
+                      </a:r>
+                      <a:r>
+                        <a:rPr lang="en-US" sz="900" dirty="0" err="1"/>
+                        <a:t>Fecha</a:t>
+                      </a:r>
+                      <a:r>
+                        <a:rPr lang="en-US" sz="900" dirty="0"/>
+                        <a:t> </a:t>
+                      </a:r>
+                      <a:r>
+                        <a:rPr lang="en-US" sz="900" dirty="0" err="1"/>
+                        <a:t>fecha</a:t>
+                      </a:r>
+                      <a:r>
+                        <a:rPr lang="en-US" sz="900" dirty="0"/>
+                        <a:t>, int </a:t>
+                      </a:r>
+                      <a:r>
+                        <a:rPr lang="en-US" sz="900" dirty="0" err="1"/>
+                        <a:t>cantidad</a:t>
+                      </a:r>
+                      <a:r>
+                        <a:rPr lang="en-US" sz="900" dirty="0"/>
+                        <a:t>)</a:t>
+                      </a:r>
+                    </a:p>
+                    <a:p>
+                      <a:r>
+                        <a:rPr lang="en-US" sz="900" dirty="0"/>
+                        <a:t>- void </a:t>
+                      </a:r>
+                      <a:r>
+                        <a:rPr lang="en-US" sz="900" dirty="0" err="1"/>
+                        <a:t>expandirListasSiEsNecesario</a:t>
+                      </a:r>
+                      <a:r>
+                        <a:rPr lang="en-US" sz="900" dirty="0"/>
                         <a:t>()</a:t>
                       </a:r>
                     </a:p>
                     <a:p>
                       <a:r>
-                        <a:rPr lang="es-419" sz="900" dirty="0"/>
-                        <a:t>+ </a:t>
-                      </a:r>
-                      <a:r>
-                        <a:rPr lang="es-419" sz="900" dirty="0" err="1"/>
-                        <a:t>iniciarSesion</a:t>
-                      </a:r>
-                      <a:r>
-                        <a:rPr lang="es-419" sz="900" dirty="0"/>
+                        <a:rPr lang="en-US" sz="900" dirty="0"/>
+                        <a:t>- bool </a:t>
+                      </a:r>
+                      <a:r>
+                        <a:rPr lang="en-US" sz="900" dirty="0" err="1"/>
+                        <a:t>validarDisponibilidad</a:t>
+                      </a:r>
+                      <a:r>
+                        <a:rPr lang="en-US" sz="900" dirty="0"/>
                         <a:t>(</a:t>
                       </a:r>
                       <a:r>
-                        <a:rPr lang="es-419" sz="900" dirty="0" err="1"/>
-                        <a:t>documentoIdentidad</a:t>
-                      </a:r>
-                      <a:r>
-                        <a:rPr lang="es-419" sz="900" dirty="0"/>
-                        <a:t>: </a:t>
-                      </a:r>
-                      <a:r>
-                        <a:rPr lang="es-419" sz="900" dirty="0" err="1"/>
-                        <a:t>char</a:t>
-                      </a:r>
-                      <a:r>
-                        <a:rPr lang="es-419" sz="900" dirty="0"/>
-                        <a:t>*, </a:t>
-                      </a:r>
-                      <a:r>
-                        <a:rPr lang="es-419" sz="900" dirty="0" err="1"/>
-                        <a:t>tipoUsuario</a:t>
-                      </a:r>
-                      <a:r>
-                        <a:rPr lang="es-419" sz="900" dirty="0"/>
-                        <a:t>: </a:t>
-                      </a:r>
-                      <a:r>
-                        <a:rPr lang="es-419" sz="900" dirty="0" err="1"/>
-                        <a:t>int</a:t>
-                      </a:r>
-                      <a:r>
-                        <a:rPr lang="es-419" sz="900" dirty="0"/>
-                        <a:t>): </a:t>
-                      </a:r>
-                      <a:r>
-                        <a:rPr lang="es-419" sz="900" dirty="0" err="1"/>
-                        <a:t>void</a:t>
-                      </a:r>
-                      <a:endParaRPr lang="es-419" sz="900" dirty="0"/>
-                    </a:p>
-                    <a:p>
-                      <a:r>
-                        <a:rPr lang="es-419" sz="900" dirty="0"/>
-                        <a:t>+ </a:t>
-                      </a:r>
-                      <a:r>
-                        <a:rPr lang="es-419" sz="900" dirty="0" err="1"/>
-                        <a:t>buscarAlojamiento</a:t>
-                      </a:r>
-                      <a:r>
-                        <a:rPr lang="es-419" sz="900" dirty="0"/>
-                        <a:t>(</a:t>
-                      </a:r>
-                      <a:r>
-                        <a:rPr lang="es-419" sz="900" dirty="0" err="1"/>
-                        <a:t>fechaInicio</a:t>
-                      </a:r>
-                      <a:r>
-                        <a:rPr lang="es-419" sz="900" dirty="0"/>
-                        <a:t>: Fecha, municipio: </a:t>
-                      </a:r>
-                      <a:r>
-                        <a:rPr lang="es-419" sz="900" dirty="0" err="1"/>
-                        <a:t>char</a:t>
-                      </a:r>
-                      <a:r>
-                        <a:rPr lang="es-419" sz="900" dirty="0"/>
-                        <a:t>*, </a:t>
-                      </a:r>
-                      <a:r>
-                        <a:rPr lang="es-419" sz="900" dirty="0" err="1"/>
+                        <a:rPr lang="en-US" sz="900" dirty="0" err="1"/>
+                        <a:t>Alojamiento</a:t>
+                      </a:r>
+                      <a:r>
+                        <a:rPr lang="en-US" sz="900" dirty="0"/>
+                        <a:t>* a, </a:t>
+                      </a:r>
+                      <a:r>
+                        <a:rPr lang="en-US" sz="900" dirty="0" err="1"/>
+                        <a:t>Fecha</a:t>
+                      </a:r>
+                      <a:r>
+                        <a:rPr lang="en-US" sz="900" dirty="0"/>
+                        <a:t> </a:t>
+                      </a:r>
+                      <a:r>
+                        <a:rPr lang="en-US" sz="900" dirty="0" err="1"/>
+                        <a:t>inicio</a:t>
+                      </a:r>
+                      <a:r>
+                        <a:rPr lang="en-US" sz="900" dirty="0"/>
+                        <a:t>, int </a:t>
+                      </a:r>
+                      <a:r>
+                        <a:rPr lang="en-US" sz="900" dirty="0" err="1"/>
                         <a:t>duracion</a:t>
                       </a:r>
                       <a:r>
-                        <a:rPr lang="es-419" sz="900" dirty="0"/>
-                        <a:t>: </a:t>
-                      </a:r>
-                      <a:r>
-                        <a:rPr lang="es-419" sz="900" dirty="0" err="1"/>
-                        <a:t>int</a:t>
-                      </a:r>
-                      <a:r>
-                        <a:rPr lang="es-419" sz="900" dirty="0"/>
-                        <a:t>, </a:t>
-                      </a:r>
-                      <a:r>
-                        <a:rPr lang="es-419" sz="900" dirty="0" err="1"/>
-                        <a:t>precioMaximo</a:t>
-                      </a:r>
-                      <a:r>
-                        <a:rPr lang="es-419" sz="900" dirty="0"/>
-                        <a:t>: </a:t>
-                      </a:r>
-                      <a:r>
-                        <a:rPr lang="es-419" sz="900" dirty="0" err="1"/>
-                        <a:t>double</a:t>
-                      </a:r>
-                      <a:r>
-                        <a:rPr lang="es-419" sz="900" dirty="0"/>
-                        <a:t>, </a:t>
-                      </a:r>
-                      <a:r>
-                        <a:rPr lang="es-419" sz="900" dirty="0" err="1"/>
-                        <a:t>puntuacionMinima</a:t>
-                      </a:r>
-                      <a:r>
-                        <a:rPr lang="es-419" sz="900" dirty="0"/>
-                        <a:t>: </a:t>
-                      </a:r>
-                      <a:r>
-                        <a:rPr lang="es-419" sz="900" dirty="0" err="1"/>
-                        <a:t>float</a:t>
-                      </a:r>
-                      <a:r>
-                        <a:rPr lang="es-419" sz="900" dirty="0"/>
-                        <a:t>): </a:t>
-                      </a:r>
-                      <a:r>
-                        <a:rPr lang="es-419" sz="900" dirty="0" err="1"/>
-                        <a:t>void</a:t>
-                      </a:r>
-                      <a:endParaRPr lang="es-419" sz="900" dirty="0"/>
-                    </a:p>
-                    <a:p>
-                      <a:r>
-                        <a:rPr lang="es-419" sz="900" dirty="0"/>
-                        <a:t>+ </a:t>
-                      </a:r>
-                      <a:r>
-                        <a:rPr lang="es-419" sz="900" dirty="0" err="1"/>
-                        <a:t>crearReservacion</a:t>
-                      </a:r>
-                      <a:r>
-                        <a:rPr lang="es-419" sz="900" dirty="0"/>
-                        <a:t>(</a:t>
-                      </a:r>
-                      <a:r>
-                        <a:rPr lang="es-419" sz="900" dirty="0" err="1"/>
-                        <a:t>documentoHuesped</a:t>
-                      </a:r>
-                      <a:r>
-                        <a:rPr lang="es-419" sz="900" dirty="0"/>
-                        <a:t>: </a:t>
-                      </a:r>
-                      <a:r>
-                        <a:rPr lang="es-419" sz="900" dirty="0" err="1"/>
-                        <a:t>char</a:t>
-                      </a:r>
-                      <a:r>
-                        <a:rPr lang="es-419" sz="900" dirty="0"/>
-                        <a:t>*, </a:t>
-                      </a:r>
-                      <a:r>
-                        <a:rPr lang="es-419" sz="900" dirty="0" err="1"/>
-                        <a:t>codigoAlojamiento</a:t>
-                      </a:r>
-                      <a:r>
-                        <a:rPr lang="es-419" sz="900" dirty="0"/>
-                        <a:t>: </a:t>
-                      </a:r>
-                      <a:r>
-                        <a:rPr lang="es-419" sz="900" dirty="0" err="1"/>
-                        <a:t>char</a:t>
-                      </a:r>
-                      <a:r>
-                        <a:rPr lang="es-419" sz="900" dirty="0"/>
-                        <a:t>*, </a:t>
-                      </a:r>
-                      <a:r>
-                        <a:rPr lang="es-419" sz="900" dirty="0" err="1"/>
-                        <a:t>fechaEntrada</a:t>
-                      </a:r>
-                      <a:r>
-                        <a:rPr lang="es-419" sz="900" dirty="0"/>
-                        <a:t>: Fecha, </a:t>
-                      </a:r>
-                      <a:r>
-                        <a:rPr lang="es-419" sz="900" dirty="0" err="1"/>
-                        <a:t>duracion</a:t>
-                      </a:r>
-                      <a:r>
-                        <a:rPr lang="es-419" sz="900" dirty="0"/>
-                        <a:t>: </a:t>
-                      </a:r>
-                      <a:r>
-                        <a:rPr lang="es-419" sz="900" dirty="0" err="1"/>
-                        <a:t>int</a:t>
-                      </a:r>
-                      <a:r>
-                        <a:rPr lang="es-419" sz="900" dirty="0"/>
-                        <a:t>, </a:t>
-                      </a:r>
-                      <a:r>
-                        <a:rPr lang="es-419" sz="900" dirty="0" err="1"/>
-                        <a:t>metodoPago</a:t>
-                      </a:r>
-                      <a:r>
-                        <a:rPr lang="es-419" sz="900" dirty="0"/>
-                        <a:t>: </a:t>
-                      </a:r>
-                      <a:r>
-                        <a:rPr lang="es-419" sz="900" dirty="0" err="1"/>
-                        <a:t>int</a:t>
-                      </a:r>
-                      <a:r>
-                        <a:rPr lang="es-419" sz="900" dirty="0"/>
-                        <a:t>, monto: </a:t>
-                      </a:r>
-                      <a:r>
-                        <a:rPr lang="es-419" sz="900" dirty="0" err="1"/>
-                        <a:t>double</a:t>
-                      </a:r>
-                      <a:r>
-                        <a:rPr lang="es-419" sz="900" dirty="0"/>
-                        <a:t>, anotaciones: </a:t>
-                      </a:r>
-                      <a:r>
-                        <a:rPr lang="es-419" sz="900" dirty="0" err="1"/>
-                        <a:t>char</a:t>
-                      </a:r>
-                      <a:r>
-                        <a:rPr lang="es-419" sz="900" dirty="0"/>
-                        <a:t>*): </a:t>
-                      </a:r>
-                      <a:r>
-                        <a:rPr lang="es-419" sz="900" dirty="0" err="1"/>
-                        <a:t>void</a:t>
-                      </a:r>
-                      <a:endParaRPr lang="es-419" sz="900" dirty="0"/>
-                    </a:p>
-                    <a:p>
-                      <a:r>
-                        <a:rPr lang="es-419" sz="900" dirty="0"/>
-                        <a:t>+ </a:t>
-                      </a:r>
-                      <a:r>
-                        <a:rPr lang="es-419" sz="900" dirty="0" err="1"/>
-                        <a:t>anularReservacion</a:t>
-                      </a:r>
-                      <a:r>
-                        <a:rPr lang="es-419" sz="900" dirty="0"/>
-                        <a:t>(</a:t>
-                      </a:r>
-                      <a:r>
-                        <a:rPr lang="es-419" sz="900" dirty="0" err="1"/>
-                        <a:t>codigoReservacion</a:t>
-                      </a:r>
-                      <a:r>
-                        <a:rPr lang="es-419" sz="900" dirty="0"/>
-                        <a:t>: </a:t>
-                      </a:r>
-                      <a:r>
-                        <a:rPr lang="es-419" sz="900" dirty="0" err="1"/>
-                        <a:t>char</a:t>
-                      </a:r>
-                      <a:r>
-                        <a:rPr lang="es-419" sz="900" dirty="0"/>
-                        <a:t>*): </a:t>
-                      </a:r>
-                      <a:r>
-                        <a:rPr lang="es-419" sz="900" dirty="0" err="1"/>
-                        <a:t>void</a:t>
-                      </a:r>
-                      <a:endParaRPr lang="es-419" sz="900" dirty="0"/>
-                    </a:p>
-                    <a:p>
-                      <a:r>
-                        <a:rPr lang="es-419" sz="900" dirty="0"/>
-                        <a:t>+</a:t>
-                      </a:r>
-                      <a:r>
-                        <a:rPr lang="es-419" sz="900" dirty="0" err="1"/>
-                        <a:t>consultarReservasAnfitrion</a:t>
-                      </a:r>
-                      <a:r>
-                        <a:rPr lang="es-419" sz="900" dirty="0"/>
-                        <a:t>(</a:t>
-                      </a:r>
-                      <a:r>
-                        <a:rPr lang="es-419" sz="900" dirty="0" err="1"/>
-                        <a:t>documentoAnfitrion</a:t>
-                      </a:r>
-                      <a:r>
-                        <a:rPr lang="es-419" sz="900" dirty="0"/>
-                        <a:t>: </a:t>
-                      </a:r>
-                      <a:r>
-                        <a:rPr lang="es-419" sz="900" dirty="0" err="1"/>
-                        <a:t>char</a:t>
-                      </a:r>
-                      <a:r>
-                        <a:rPr lang="es-419" sz="900" dirty="0"/>
-                        <a:t>*, </a:t>
-                      </a:r>
-                      <a:r>
-                        <a:rPr lang="es-419" sz="900" dirty="0" err="1"/>
-                        <a:t>fechaDesde</a:t>
-                      </a:r>
-                      <a:r>
-                        <a:rPr lang="es-419" sz="900" dirty="0"/>
-                        <a:t>: Fecha, </a:t>
-                      </a:r>
-                      <a:r>
-                        <a:rPr lang="es-419" sz="900" dirty="0" err="1"/>
-                        <a:t>fechaHasta</a:t>
-                      </a:r>
-                      <a:r>
-                        <a:rPr lang="es-419" sz="900" dirty="0"/>
-                        <a:t>: Fecha): </a:t>
-                      </a:r>
-                      <a:r>
-                        <a:rPr lang="es-419" sz="900" dirty="0" err="1"/>
-                        <a:t>void</a:t>
-                      </a:r>
-                      <a:endParaRPr lang="es-419" sz="900" dirty="0"/>
-                    </a:p>
-                    <a:p>
-                      <a:r>
-                        <a:rPr lang="es-419" sz="900" dirty="0"/>
-                        <a:t>+</a:t>
-                      </a:r>
-                      <a:r>
-                        <a:rPr lang="es-419" sz="900" dirty="0" err="1"/>
-                        <a:t>actualizarReservacionesHistoricas</a:t>
-                      </a:r>
-                      <a:r>
-                        <a:rPr lang="es-419" sz="900" dirty="0"/>
-                        <a:t>(</a:t>
-                      </a:r>
-                      <a:r>
-                        <a:rPr lang="es-419" sz="900" dirty="0" err="1"/>
-                        <a:t>nuevaFechaCorte</a:t>
-                      </a:r>
-                      <a:r>
-                        <a:rPr lang="es-419" sz="900" dirty="0"/>
-                        <a:t>: Fecha): </a:t>
-                      </a:r>
-                      <a:r>
-                        <a:rPr lang="es-419" sz="900" dirty="0" err="1"/>
-                        <a:t>void</a:t>
-                      </a:r>
-                      <a:endParaRPr lang="es-419" sz="900" dirty="0"/>
-                    </a:p>
-                    <a:p>
-                      <a:r>
-                        <a:rPr lang="es-419" sz="900" dirty="0"/>
-                        <a:t>+ </a:t>
-                      </a:r>
-                      <a:r>
-                        <a:rPr lang="es-419" sz="900" dirty="0" err="1"/>
-                        <a:t>medirConsumoDeRecursos</a:t>
-                      </a:r>
-                      <a:r>
-                        <a:rPr lang="es-419" sz="900" dirty="0"/>
-                        <a:t>(): </a:t>
-                      </a:r>
-                      <a:r>
-                        <a:rPr lang="es-419" sz="900" dirty="0" err="1"/>
-                        <a:t>void</a:t>
-                      </a:r>
-                      <a:endParaRPr lang="es-419" sz="900" dirty="0"/>
-                    </a:p>
-                    <a:p>
-                      <a:r>
-                        <a:rPr lang="es-419" sz="900" dirty="0"/>
-                        <a:t>+ </a:t>
-                      </a:r>
-                      <a:r>
-                        <a:rPr lang="es-419" sz="900" dirty="0" err="1"/>
-                        <a:t>cargarDatosDesdeArchivo</a:t>
-                      </a:r>
-                      <a:r>
-                        <a:rPr lang="es-419" sz="900" dirty="0"/>
-                        <a:t>(): </a:t>
-                      </a:r>
-                      <a:r>
-                        <a:rPr lang="es-419" sz="900" dirty="0" err="1"/>
-                        <a:t>void</a:t>
-                      </a:r>
-                      <a:endParaRPr lang="es-419" sz="900" dirty="0"/>
-                    </a:p>
-                    <a:p>
-                      <a:r>
-                        <a:rPr lang="es-419" sz="900" dirty="0"/>
-                        <a:t>+ </a:t>
-                      </a:r>
-                      <a:r>
-                        <a:rPr lang="es-419" sz="900" dirty="0" err="1"/>
-                        <a:t>guardarDatosEnArchivo</a:t>
-                      </a:r>
-                      <a:r>
-                        <a:rPr lang="es-419" sz="900" dirty="0"/>
-                        <a:t>(): </a:t>
-                      </a:r>
-                      <a:r>
-                        <a:rPr lang="es-419" sz="900" dirty="0" err="1"/>
-                        <a:t>void</a:t>
+                        <a:rPr lang="en-US" sz="900" dirty="0"/>
+                        <a:t>)</a:t>
                       </a:r>
                       <a:endParaRPr lang="en-CO" sz="900" dirty="0"/>
                     </a:p>
@@ -5562,15 +4773,14 @@
           </p:cNvPr>
           <p:cNvCxnSpPr>
             <a:cxnSpLocks/>
-            <a:stCxn id="8" idx="0"/>
             <a:endCxn id="3" idx="2"/>
           </p:cNvCxnSpPr>
           <p:nvPr/>
         </p:nvCxnSpPr>
         <p:spPr>
-          <a:xfrm flipV="1">
-            <a:off x="1750558" y="4725981"/>
-            <a:ext cx="0" cy="370536"/>
+          <a:xfrm flipH="1">
+            <a:off x="1658623" y="5616181"/>
+            <a:ext cx="216591" cy="0"/>
           </a:xfrm>
           <a:prstGeom prst="line">
             <a:avLst/>
@@ -5654,14 +4864,14 @@
           <p:nvPr>
             <p:extLst>
               <p:ext uri="{D42A27DB-BD31-4B8C-83A1-F6EECF244321}">
-                <p14:modId xmlns:p14="http://schemas.microsoft.com/office/powerpoint/2010/main" val="477826820"/>
+                <p14:modId xmlns:p14="http://schemas.microsoft.com/office/powerpoint/2010/main" val="1710120569"/>
               </p:ext>
             </p:extLst>
           </p:nvPr>
         </p:nvGraphicFramePr>
         <p:xfrm>
           <a:off x="6478502" y="131121"/>
-          <a:ext cx="2285551" cy="5692140"/>
+          <a:ext cx="2285551" cy="6103620"/>
         </p:xfrm>
         <a:graphic>
           <a:graphicData uri="http://schemas.openxmlformats.org/drawingml/2006/table">
@@ -5708,7 +4918,7 @@
                     <a:p>
                       <a:r>
                         <a:rPr lang="en-US" sz="900" dirty="0"/>
-                        <a:t>– </a:t>
+                        <a:t>- </a:t>
                       </a:r>
                       <a:r>
                         <a:rPr lang="en-US" sz="900" dirty="0" err="1"/>
@@ -5722,7 +4932,7 @@
                     <a:p>
                       <a:r>
                         <a:rPr lang="en-US" sz="900" dirty="0"/>
-                        <a:t>– </a:t>
+                        <a:t>- </a:t>
                       </a:r>
                       <a:r>
                         <a:rPr lang="en-US" sz="900" dirty="0" err="1"/>
@@ -5736,19 +4946,27 @@
                     <a:p>
                       <a:r>
                         <a:rPr lang="en-US" sz="900" dirty="0"/>
-                        <a:t>– Departamento: char*</a:t>
-                      </a:r>
-                    </a:p>
-                    <a:p>
-                      <a:r>
-                        <a:rPr lang="en-US" sz="900" dirty="0"/>
-                        <a:t>– Municipio: char*</a:t>
-                      </a:r>
-                    </a:p>
-                    <a:p>
-                      <a:r>
-                        <a:rPr lang="en-US" sz="900" dirty="0"/>
-                        <a:t>– </a:t>
+                        <a:t>- </a:t>
+                      </a:r>
+                      <a:r>
+                        <a:rPr lang="en-US" sz="900" dirty="0" err="1"/>
+                        <a:t>departamento</a:t>
+                      </a:r>
+                      <a:r>
+                        <a:rPr lang="en-US" sz="900" dirty="0"/>
+                        <a:t>: char*</a:t>
+                      </a:r>
+                    </a:p>
+                    <a:p>
+                      <a:r>
+                        <a:rPr lang="en-US" sz="900" dirty="0"/>
+                        <a:t>- municipio: char*</a:t>
+                      </a:r>
+                    </a:p>
+                    <a:p>
+                      <a:r>
+                        <a:rPr lang="en-US" sz="900" dirty="0"/>
+                        <a:t>- </a:t>
                       </a:r>
                       <a:r>
                         <a:rPr lang="en-US" sz="900" dirty="0" err="1"/>
@@ -5762,7 +4980,7 @@
                     <a:p>
                       <a:r>
                         <a:rPr lang="en-US" sz="900" dirty="0"/>
-                        <a:t>– </a:t>
+                        <a:t>- </a:t>
                       </a:r>
                       <a:r>
                         <a:rPr lang="en-US" sz="900" dirty="0" err="1"/>
@@ -5770,18 +4988,13 @@
                       </a:r>
                       <a:r>
                         <a:rPr lang="en-US" sz="900" dirty="0"/>
-                        <a:t>: int  // 0 = casa, 1 = </a:t>
-                      </a:r>
-                      <a:r>
-                        <a:rPr lang="en-US" sz="900" dirty="0" err="1"/>
-                        <a:t>apartamento</a:t>
-                      </a:r>
-                      <a:endParaRPr lang="en-US" sz="900" dirty="0"/>
-                    </a:p>
-                    <a:p>
-                      <a:r>
-                        <a:rPr lang="en-US" sz="900" dirty="0"/>
-                        <a:t>– </a:t>
+                        <a:t>: int</a:t>
+                      </a:r>
+                    </a:p>
+                    <a:p>
+                      <a:r>
+                        <a:rPr lang="en-US" sz="900" dirty="0"/>
+                        <a:t>- </a:t>
                       </a:r>
                       <a:r>
                         <a:rPr lang="en-US" sz="900" dirty="0" err="1"/>
@@ -5795,7 +5008,7 @@
                     <a:p>
                       <a:r>
                         <a:rPr lang="en-US" sz="900" dirty="0"/>
-                        <a:t>– </a:t>
+                        <a:t>- </a:t>
                       </a:r>
                       <a:r>
                         <a:rPr lang="en-US" sz="900" dirty="0" err="1"/>
@@ -5803,13 +5016,13 @@
                       </a:r>
                       <a:r>
                         <a:rPr lang="en-US" sz="900" dirty="0"/>
-                        <a:t>: int       </a:t>
-                      </a:r>
-                    </a:p>
-                    <a:p>
-                      <a:r>
-                        <a:rPr lang="en-US" sz="900" dirty="0"/>
-                        <a:t>– </a:t>
+                        <a:t>: int</a:t>
+                      </a:r>
+                    </a:p>
+                    <a:p>
+                      <a:r>
+                        <a:rPr lang="en-US" sz="900" dirty="0"/>
+                        <a:t>- </a:t>
                       </a:r>
                       <a:r>
                         <a:rPr lang="en-US" sz="900" dirty="0" err="1"/>
@@ -5831,7 +5044,7 @@
                     <a:p>
                       <a:r>
                         <a:rPr lang="en-US" sz="900" dirty="0"/>
-                        <a:t>– </a:t>
+                        <a:t>- </a:t>
                       </a:r>
                       <a:r>
                         <a:rPr lang="en-US" sz="900" dirty="0" err="1"/>
@@ -5845,11 +5058,11 @@
                     <a:p>
                       <a:r>
                         <a:rPr lang="en-US" sz="900" dirty="0"/>
-                        <a:t>– </a:t>
-                      </a:r>
-                      <a:r>
-                        <a:rPr lang="en-US" sz="900" dirty="0" err="1"/>
-                        <a:t>cantidadReservaciones</a:t>
+                        <a:t>- </a:t>
+                      </a:r>
+                      <a:r>
+                        <a:rPr lang="en-US" sz="900" dirty="0" err="1"/>
+                        <a:t>cantidadReservas</a:t>
                       </a:r>
                       <a:r>
                         <a:rPr lang="en-US" sz="900" dirty="0"/>
@@ -5859,11 +5072,11 @@
                     <a:p>
                       <a:r>
                         <a:rPr lang="en-US" sz="900" dirty="0"/>
-                        <a:t>– </a:t>
-                      </a:r>
-                      <a:r>
-                        <a:rPr lang="en-US" sz="900" dirty="0" err="1"/>
-                        <a:t>capacidadReservaciones</a:t>
+                        <a:t>- </a:t>
+                      </a:r>
+                      <a:r>
+                        <a:rPr lang="en-US" sz="900" dirty="0" err="1"/>
+                        <a:t>capacidadReservas</a:t>
                       </a:r>
                       <a:r>
                         <a:rPr lang="en-US" sz="900" dirty="0"/>
@@ -5873,7 +5086,7 @@
                     <a:p>
                       <a:r>
                         <a:rPr lang="en-US" sz="900" dirty="0"/>
-                        <a:t>– </a:t>
+                        <a:t>- </a:t>
                       </a:r>
                       <a:r>
                         <a:rPr lang="en-US" sz="900" dirty="0" err="1"/>
@@ -6354,7 +5567,7 @@
                       </a:r>
                       <a:r>
                         <a:rPr lang="es-419" sz="900" dirty="0" err="1"/>
-                        <a:t>agregarReservacion</a:t>
+                        <a:t>agregarReserva</a:t>
                       </a:r>
                       <a:r>
                         <a:rPr lang="es-419" sz="900" dirty="0"/>
@@ -6397,7 +5610,7 @@
                       </a:r>
                       <a:r>
                         <a:rPr lang="es-419" sz="900" dirty="0" err="1"/>
-                        <a:t>eliminarReservacion</a:t>
+                        <a:t>eliminarReserva</a:t>
                       </a:r>
                       <a:r>
                         <a:rPr lang="es-419" sz="900" dirty="0"/>
@@ -6405,7 +5618,7 @@
                       </a:r>
                       <a:r>
                         <a:rPr lang="es-419" sz="900" dirty="0" err="1"/>
-                        <a:t>codigoReservacion</a:t>
+                        <a:t>codigoReserva</a:t>
                       </a:r>
                       <a:r>
                         <a:rPr lang="es-419" sz="900" dirty="0"/>
@@ -6445,6 +5658,105 @@
                       <a:r>
                         <a:rPr lang="es-419" sz="900" dirty="0"/>
                         <a:t>*</a:t>
+                      </a:r>
+                      <a:br>
+                        <a:rPr lang="es-419" sz="900" dirty="0"/>
+                      </a:br>
+                      <a:r>
+                        <a:rPr lang="es-ES" sz="900" dirty="0"/>
+                        <a:t>- </a:t>
+                      </a:r>
+                      <a:r>
+                        <a:rPr lang="es-ES" sz="900" dirty="0" err="1"/>
+                        <a:t>int</a:t>
+                      </a:r>
+                      <a:r>
+                        <a:rPr lang="es-ES" sz="900" dirty="0"/>
+                        <a:t> </a:t>
+                      </a:r>
+                      <a:r>
+                        <a:rPr lang="es-ES" sz="900" dirty="0" err="1"/>
+                        <a:t>buscarReserva</a:t>
+                      </a:r>
+                      <a:r>
+                        <a:rPr lang="es-ES" sz="900" dirty="0"/>
+                        <a:t>(</a:t>
+                      </a:r>
+                      <a:r>
+                        <a:rPr lang="es-ES" sz="900" dirty="0" err="1"/>
+                        <a:t>char</a:t>
+                      </a:r>
+                      <a:r>
+                        <a:rPr lang="es-ES" sz="900" dirty="0"/>
+                        <a:t>* </a:t>
+                      </a:r>
+                      <a:r>
+                        <a:rPr lang="es-ES" sz="900" dirty="0" err="1"/>
+                        <a:t>codigo</a:t>
+                      </a:r>
+                      <a:r>
+                        <a:rPr lang="es-ES" sz="900" dirty="0"/>
+                        <a:t>)</a:t>
+                      </a:r>
+                    </a:p>
+                    <a:p>
+                      <a:r>
+                        <a:rPr lang="es-ES" sz="900" dirty="0"/>
+                        <a:t>- </a:t>
+                      </a:r>
+                      <a:r>
+                        <a:rPr lang="es-ES" sz="900" dirty="0" err="1"/>
+                        <a:t>void</a:t>
+                      </a:r>
+                      <a:r>
+                        <a:rPr lang="es-ES" sz="900" dirty="0"/>
+                        <a:t> </a:t>
+                      </a:r>
+                      <a:r>
+                        <a:rPr lang="es-ES" sz="900" dirty="0" err="1"/>
+                        <a:t>expandirReservas</a:t>
+                      </a:r>
+                      <a:r>
+                        <a:rPr lang="es-ES" sz="900" dirty="0"/>
+                        <a:t>()</a:t>
+                      </a:r>
+                    </a:p>
+                    <a:p>
+                      <a:r>
+                        <a:rPr lang="es-ES" sz="900" dirty="0"/>
+                        <a:t>- </a:t>
+                      </a:r>
+                      <a:r>
+                        <a:rPr lang="es-ES" sz="900" dirty="0" err="1"/>
+                        <a:t>bool</a:t>
+                      </a:r>
+                      <a:r>
+                        <a:rPr lang="es-ES" sz="900" dirty="0"/>
+                        <a:t> </a:t>
+                      </a:r>
+                      <a:r>
+                        <a:rPr lang="es-ES" sz="900" dirty="0" err="1"/>
+                        <a:t>seCruzanFechas</a:t>
+                      </a:r>
+                      <a:r>
+                        <a:rPr lang="es-ES" sz="900" dirty="0"/>
+                        <a:t>(Fecha nueva, </a:t>
+                      </a:r>
+                      <a:r>
+                        <a:rPr lang="es-ES" sz="900" dirty="0" err="1"/>
+                        <a:t>int</a:t>
+                      </a:r>
+                      <a:r>
+                        <a:rPr lang="es-ES" sz="900" dirty="0"/>
+                        <a:t> </a:t>
+                      </a:r>
+                      <a:r>
+                        <a:rPr lang="es-ES" sz="900" dirty="0" err="1"/>
+                        <a:t>duracion</a:t>
+                      </a:r>
+                      <a:r>
+                        <a:rPr lang="es-ES" sz="900" dirty="0"/>
+                        <a:t>)</a:t>
                       </a:r>
                       <a:endParaRPr lang="en-CO" sz="900" dirty="0"/>
                     </a:p>
@@ -6472,13 +5784,14 @@
           </p:cNvPr>
           <p:cNvCxnSpPr>
             <a:cxnSpLocks/>
+            <a:endCxn id="6" idx="2"/>
           </p:cNvCxnSpPr>
           <p:nvPr/>
         </p:nvCxnSpPr>
         <p:spPr>
           <a:xfrm flipV="1">
-            <a:off x="4571999" y="2653341"/>
-            <a:ext cx="0" cy="418938"/>
+            <a:off x="4572000" y="2278621"/>
+            <a:ext cx="2" cy="68339"/>
           </a:xfrm>
           <a:prstGeom prst="line">
             <a:avLst/>
@@ -6709,13 +6022,14 @@
           <p:cNvCxnSpPr>
             <a:cxnSpLocks/>
             <a:stCxn id="51" idx="0"/>
+            <a:endCxn id="42" idx="2"/>
           </p:cNvCxnSpPr>
           <p:nvPr/>
         </p:nvCxnSpPr>
         <p:spPr>
           <a:xfrm flipV="1">
-            <a:off x="7621277" y="5823261"/>
-            <a:ext cx="9524" cy="601987"/>
+            <a:off x="7621277" y="6234741"/>
+            <a:ext cx="0" cy="190507"/>
           </a:xfrm>
           <a:prstGeom prst="line">
             <a:avLst/>
@@ -7029,7 +6343,7 @@
         </p:nvSpPr>
         <p:spPr>
           <a:xfrm>
-            <a:off x="4536555" y="2838691"/>
+            <a:off x="5389673" y="1793983"/>
             <a:ext cx="266420" cy="276999"/>
           </a:xfrm>
           <a:prstGeom prst="rect">
@@ -7065,79 +6379,7 @@
         </p:nvSpPr>
         <p:spPr>
           <a:xfrm>
-            <a:off x="4536555" y="2605634"/>
-            <a:ext cx="266420" cy="276999"/>
-          </a:xfrm>
-          <a:prstGeom prst="rect">
-            <a:avLst/>
-          </a:prstGeom>
-          <a:noFill/>
-        </p:spPr>
-        <p:txBody>
-          <a:bodyPr wrap="none" rtlCol="0">
-            <a:spAutoFit/>
-          </a:bodyPr>
-          <a:lstStyle/>
-          <a:p>
-            <a:r>
-              <a:rPr lang="es-ES" sz="1200" dirty="0"/>
-              <a:t>1</a:t>
-            </a:r>
-            <a:endParaRPr lang="es-CO" sz="1200" dirty="0"/>
-          </a:p>
-        </p:txBody>
-      </p:sp>
-      <p:sp>
-        <p:nvSpPr>
-          <p:cNvPr id="28" name="CuadroTexto 16">
-            <a:extLst>
-              <a:ext uri="{FF2B5EF4-FFF2-40B4-BE49-F238E27FC236}">
-                <a16:creationId xmlns:a16="http://schemas.microsoft.com/office/drawing/2014/main" id="{917B2054-9F3B-2D56-D1F2-2E03C2E3CDD0}"/>
-              </a:ext>
-            </a:extLst>
-          </p:cNvPr>
-          <p:cNvSpPr txBox="1"/>
-          <p:nvPr/>
-        </p:nvSpPr>
-        <p:spPr>
-          <a:xfrm>
-            <a:off x="1706108" y="4863968"/>
-            <a:ext cx="266420" cy="276999"/>
-          </a:xfrm>
-          <a:prstGeom prst="rect">
-            <a:avLst/>
-          </a:prstGeom>
-          <a:noFill/>
-        </p:spPr>
-        <p:txBody>
-          <a:bodyPr wrap="none" rtlCol="0">
-            <a:spAutoFit/>
-          </a:bodyPr>
-          <a:lstStyle/>
-          <a:p>
-            <a:r>
-              <a:rPr lang="es-ES" sz="1200" dirty="0"/>
-              <a:t>1</a:t>
-            </a:r>
-            <a:endParaRPr lang="es-CO" sz="1200" dirty="0"/>
-          </a:p>
-        </p:txBody>
-      </p:sp>
-      <p:sp>
-        <p:nvSpPr>
-          <p:cNvPr id="29" name="CuadroTexto 16">
-            <a:extLst>
-              <a:ext uri="{FF2B5EF4-FFF2-40B4-BE49-F238E27FC236}">
-                <a16:creationId xmlns:a16="http://schemas.microsoft.com/office/drawing/2014/main" id="{86403EC8-A7C5-0F97-9D09-E5916F05F9F1}"/>
-              </a:ext>
-            </a:extLst>
-          </p:cNvPr>
-          <p:cNvSpPr txBox="1"/>
-          <p:nvPr/>
-        </p:nvSpPr>
-        <p:spPr>
-          <a:xfrm>
-            <a:off x="1706108" y="4681531"/>
+            <a:off x="5414281" y="1996850"/>
             <a:ext cx="266420" cy="276999"/>
           </a:xfrm>
           <a:prstGeom prst="rect">
@@ -7195,6 +6437,156 @@
           </a:p>
         </p:txBody>
       </p:sp>
+      <p:graphicFrame>
+        <p:nvGraphicFramePr>
+          <p:cNvPr id="13" name="Table 9">
+            <a:extLst>
+              <a:ext uri="{FF2B5EF4-FFF2-40B4-BE49-F238E27FC236}">
+                <a16:creationId xmlns:a16="http://schemas.microsoft.com/office/drawing/2014/main" id="{6F7039AA-5065-1680-9871-DFA51830A66D}"/>
+              </a:ext>
+            </a:extLst>
+          </p:cNvPr>
+          <p:cNvGraphicFramePr>
+            <a:graphicFrameLocks noGrp="1"/>
+          </p:cNvGraphicFramePr>
+          <p:nvPr>
+            <p:extLst>
+              <p:ext uri="{D42A27DB-BD31-4B8C-83A1-F6EECF244321}">
+                <p14:modId xmlns:p14="http://schemas.microsoft.com/office/powerpoint/2010/main" val="123254151"/>
+              </p:ext>
+            </p:extLst>
+          </p:nvPr>
+        </p:nvGraphicFramePr>
+        <p:xfrm>
+          <a:off x="659282" y="6273832"/>
+          <a:ext cx="2285551" cy="743902"/>
+        </p:xfrm>
+        <a:graphic>
+          <a:graphicData uri="http://schemas.openxmlformats.org/drawingml/2006/table">
+            <a:tbl>
+              <a:tblPr firstRow="1" bandRow="1">
+                <a:tableStyleId>{5940675A-B579-460E-94D1-54222C63F5DA}</a:tableStyleId>
+              </a:tblPr>
+              <a:tblGrid>
+                <a:gridCol w="2285551">
+                  <a:extLst>
+                    <a:ext uri="{9D8B030D-6E8A-4147-A177-3AD203B41FA5}">
+                      <a16:colId xmlns:a16="http://schemas.microsoft.com/office/drawing/2014/main" val="2587242417"/>
+                    </a:ext>
+                  </a:extLst>
+                </a:gridCol>
+              </a:tblGrid>
+              <a:tr h="0">
+                <a:tc>
+                  <a:txBody>
+                    <a:bodyPr/>
+                    <a:lstStyle/>
+                    <a:p>
+                      <a:pPr algn="ctr"/>
+                      <a:r>
+                        <a:rPr lang="es-419" sz="900" dirty="0" err="1"/>
+                        <a:t>Huesped</a:t>
+                      </a:r>
+                      <a:endParaRPr lang="en-CO" sz="900" dirty="0"/>
+                    </a:p>
+                  </a:txBody>
+                  <a:tcPr marL="68580" marR="68580" marT="34290" marB="34290"/>
+                </a:tc>
+                <a:extLst>
+                  <a:ext uri="{0D108BD9-81ED-4DB2-BD59-A6C34878D82A}">
+                    <a16:rowId xmlns:a16="http://schemas.microsoft.com/office/drawing/2014/main" val="3263559475"/>
+                  </a:ext>
+                </a:extLst>
+              </a:tr>
+              <a:tr h="271462">
+                <a:tc>
+                  <a:txBody>
+                    <a:bodyPr/>
+                    <a:lstStyle/>
+                    <a:p>
+                      <a:r>
+                        <a:rPr lang="en-US" sz="900" dirty="0"/>
+                        <a:t>…</a:t>
+                      </a:r>
+                      <a:endParaRPr lang="en-CO" sz="900" dirty="0"/>
+                    </a:p>
+                  </a:txBody>
+                  <a:tcPr marL="68580" marR="68580" marT="34290" marB="34290"/>
+                </a:tc>
+                <a:extLst>
+                  <a:ext uri="{0D108BD9-81ED-4DB2-BD59-A6C34878D82A}">
+                    <a16:rowId xmlns:a16="http://schemas.microsoft.com/office/drawing/2014/main" val="2954312317"/>
+                  </a:ext>
+                </a:extLst>
+              </a:tr>
+              <a:tr h="266700">
+                <a:tc>
+                  <a:txBody>
+                    <a:bodyPr/>
+                    <a:lstStyle/>
+                    <a:p>
+                      <a:r>
+                        <a:rPr lang="en-US" sz="900" dirty="0"/>
+                        <a:t>…</a:t>
+                      </a:r>
+                      <a:endParaRPr lang="en-CO" sz="900" dirty="0"/>
+                    </a:p>
+                  </a:txBody>
+                  <a:tcPr marL="68580" marR="68580" marT="34290" marB="34290"/>
+                </a:tc>
+                <a:extLst>
+                  <a:ext uri="{0D108BD9-81ED-4DB2-BD59-A6C34878D82A}">
+                    <a16:rowId xmlns:a16="http://schemas.microsoft.com/office/drawing/2014/main" val="2815277544"/>
+                  </a:ext>
+                </a:extLst>
+              </a:tr>
+            </a:tbl>
+          </a:graphicData>
+        </a:graphic>
+      </p:graphicFrame>
+      <p:cxnSp>
+        <p:nvCxnSpPr>
+          <p:cNvPr id="15" name="Conector recto 4">
+            <a:extLst>
+              <a:ext uri="{FF2B5EF4-FFF2-40B4-BE49-F238E27FC236}">
+                <a16:creationId xmlns:a16="http://schemas.microsoft.com/office/drawing/2014/main" id="{9369EA49-EF1D-B339-72B4-7151CC92B96D}"/>
+              </a:ext>
+            </a:extLst>
+          </p:cNvPr>
+          <p:cNvCxnSpPr>
+            <a:cxnSpLocks/>
+          </p:cNvCxnSpPr>
+          <p:nvPr/>
+        </p:nvCxnSpPr>
+        <p:spPr>
+          <a:xfrm flipV="1">
+            <a:off x="1766918" y="5616181"/>
+            <a:ext cx="0" cy="657651"/>
+          </a:xfrm>
+          <a:prstGeom prst="line">
+            <a:avLst/>
+          </a:prstGeom>
+          <a:ln>
+            <a:solidFill>
+              <a:schemeClr val="tx1"/>
+            </a:solidFill>
+          </a:ln>
+        </p:spPr>
+        <p:style>
+          <a:lnRef idx="2">
+            <a:schemeClr val="accent1"/>
+          </a:lnRef>
+          <a:fillRef idx="0">
+            <a:schemeClr val="accent1"/>
+          </a:fillRef>
+          <a:effectRef idx="1">
+            <a:schemeClr val="accent1"/>
+          </a:effectRef>
+          <a:fontRef idx="minor">
+            <a:schemeClr val="tx1"/>
+          </a:fontRef>
+        </p:style>
+      </p:cxnSp>
     </p:spTree>
     <p:extLst>
       <p:ext uri="{BB962C8B-B14F-4D97-AF65-F5344CB8AC3E}">
@@ -7240,14 +6632,14 @@
           <p:nvPr>
             <p:extLst>
               <p:ext uri="{D42A27DB-BD31-4B8C-83A1-F6EECF244321}">
-                <p14:modId xmlns:p14="http://schemas.microsoft.com/office/powerpoint/2010/main" val="1219453021"/>
+                <p14:modId xmlns:p14="http://schemas.microsoft.com/office/powerpoint/2010/main" val="3097733784"/>
               </p:ext>
             </p:extLst>
           </p:nvPr>
         </p:nvGraphicFramePr>
         <p:xfrm>
           <a:off x="3467323" y="1214431"/>
-          <a:ext cx="2388550" cy="3634740"/>
+          <a:ext cx="2388550" cy="3771900"/>
         </p:xfrm>
         <a:graphic>
           <a:graphicData uri="http://schemas.openxmlformats.org/drawingml/2006/table">
@@ -7294,7 +6686,7 @@
                     <a:p>
                       <a:r>
                         <a:rPr lang="en-US" sz="900" dirty="0"/>
-                        <a:t>– </a:t>
+                        <a:t>- </a:t>
                       </a:r>
                       <a:r>
                         <a:rPr lang="en-US" sz="900" dirty="0" err="1"/>
@@ -7308,7 +6700,7 @@
                     <a:p>
                       <a:r>
                         <a:rPr lang="en-US" sz="900" dirty="0"/>
-                        <a:t>– </a:t>
+                        <a:t>- </a:t>
                       </a:r>
                       <a:r>
                         <a:rPr lang="en-US" sz="900" dirty="0" err="1"/>
@@ -7322,7 +6714,7 @@
                     <a:p>
                       <a:r>
                         <a:rPr lang="en-US" sz="900" dirty="0"/>
-                        <a:t>– </a:t>
+                        <a:t>- </a:t>
                       </a:r>
                       <a:r>
                         <a:rPr lang="en-US" sz="900" dirty="0" err="1"/>
@@ -7336,7 +6728,7 @@
                     <a:p>
                       <a:r>
                         <a:rPr lang="en-US" sz="900" dirty="0"/>
-                        <a:t>– </a:t>
+                        <a:t>- </a:t>
                       </a:r>
                       <a:r>
                         <a:rPr lang="en-US" sz="900" dirty="0" err="1"/>
@@ -7350,7 +6742,7 @@
                     <a:p>
                       <a:r>
                         <a:rPr lang="en-US" sz="900" dirty="0"/>
-                        <a:t>– </a:t>
+                        <a:t>- </a:t>
                       </a:r>
                       <a:r>
                         <a:rPr lang="en-US" sz="900" dirty="0" err="1"/>
@@ -7372,7 +6764,7 @@
                     <a:p>
                       <a:r>
                         <a:rPr lang="en-US" sz="900" dirty="0"/>
-                        <a:t>– </a:t>
+                        <a:t>- </a:t>
                       </a:r>
                       <a:r>
                         <a:rPr lang="en-US" sz="900" dirty="0" err="1"/>
@@ -7386,7 +6778,7 @@
                     <a:p>
                       <a:r>
                         <a:rPr lang="en-US" sz="900" dirty="0"/>
-                        <a:t>– </a:t>
+                        <a:t>- </a:t>
                       </a:r>
                       <a:r>
                         <a:rPr lang="en-US" sz="900" dirty="0" err="1"/>
@@ -7691,7 +7083,7 @@
                       </a:r>
                       <a:r>
                         <a:rPr lang="es-419" sz="900" dirty="0" err="1"/>
-                        <a:t>verReservaciones</a:t>
+                        <a:t>verReservas</a:t>
                       </a:r>
                       <a:r>
                         <a:rPr lang="es-419" sz="900" dirty="0"/>
@@ -7726,7 +7118,7 @@
                       </a:r>
                       <a:r>
                         <a:rPr lang="es-419" sz="900" dirty="0" err="1"/>
-                        <a:t>anularReservacion</a:t>
+                        <a:t>anularReserva</a:t>
                       </a:r>
                       <a:r>
                         <a:rPr lang="es-419" sz="900" dirty="0"/>
@@ -7734,7 +7126,7 @@
                       </a:r>
                       <a:r>
                         <a:rPr lang="es-419" sz="900" dirty="0" err="1"/>
-                        <a:t>codigoReservacion</a:t>
+                        <a:t>codigoReserva</a:t>
                       </a:r>
                       <a:r>
                         <a:rPr lang="es-419" sz="900" dirty="0"/>
@@ -7751,6 +7143,438 @@
                       <a:r>
                         <a:rPr lang="es-419" sz="900" dirty="0" err="1"/>
                         <a:t>void</a:t>
+                      </a:r>
+                      <a:br>
+                        <a:rPr lang="es-419" sz="900" dirty="0"/>
+                      </a:br>
+                      <a:r>
+                        <a:rPr lang="es-419" sz="900" dirty="0"/>
+                        <a:t>- </a:t>
+                      </a:r>
+                      <a:r>
+                        <a:rPr lang="es-419" sz="900" dirty="0" err="1"/>
+                        <a:t>int</a:t>
+                      </a:r>
+                      <a:r>
+                        <a:rPr lang="es-419" sz="900" dirty="0"/>
+                        <a:t> </a:t>
+                      </a:r>
+                      <a:r>
+                        <a:rPr lang="es-419" sz="900" dirty="0" err="1"/>
+                        <a:t>buscarAlojamiento</a:t>
+                      </a:r>
+                      <a:r>
+                        <a:rPr lang="es-419" sz="900" dirty="0"/>
+                        <a:t>(</a:t>
+                      </a:r>
+                      <a:r>
+                        <a:rPr lang="es-419" sz="900" dirty="0" err="1"/>
+                        <a:t>char</a:t>
+                      </a:r>
+                      <a:r>
+                        <a:rPr lang="es-419" sz="900" dirty="0"/>
+                        <a:t>* </a:t>
+                      </a:r>
+                      <a:r>
+                        <a:rPr lang="es-419" sz="900" dirty="0" err="1"/>
+                        <a:t>codigo</a:t>
+                      </a:r>
+                      <a:r>
+                        <a:rPr lang="es-419" sz="900" dirty="0"/>
+                        <a:t>)</a:t>
+                      </a:r>
+                    </a:p>
+                    <a:p>
+                      <a:r>
+                        <a:rPr lang="es-419" sz="900" dirty="0"/>
+                        <a:t>- </a:t>
+                      </a:r>
+                      <a:r>
+                        <a:rPr lang="es-419" sz="900" dirty="0" err="1"/>
+                        <a:t>void</a:t>
+                      </a:r>
+                      <a:r>
+                        <a:rPr lang="es-419" sz="900" dirty="0"/>
+                        <a:t> </a:t>
+                      </a:r>
+                      <a:r>
+                        <a:rPr lang="es-419" sz="900" dirty="0" err="1"/>
+                        <a:t>expandirAlojamientos</a:t>
+                      </a:r>
+                      <a:r>
+                        <a:rPr lang="es-419" sz="900" dirty="0"/>
+                        <a:t>()</a:t>
+                      </a:r>
+                      <a:endParaRPr lang="en-CO" sz="900" dirty="0"/>
+                    </a:p>
+                  </a:txBody>
+                  <a:tcPr marL="68580" marR="68580" marT="34290" marB="34290"/>
+                </a:tc>
+                <a:extLst>
+                  <a:ext uri="{0D108BD9-81ED-4DB2-BD59-A6C34878D82A}">
+                    <a16:rowId xmlns:a16="http://schemas.microsoft.com/office/drawing/2014/main" val="2815277544"/>
+                  </a:ext>
+                </a:extLst>
+              </a:tr>
+            </a:tbl>
+          </a:graphicData>
+        </a:graphic>
+      </p:graphicFrame>
+      <p:graphicFrame>
+        <p:nvGraphicFramePr>
+          <p:cNvPr id="8" name="Table 7">
+            <a:extLst>
+              <a:ext uri="{FF2B5EF4-FFF2-40B4-BE49-F238E27FC236}">
+                <a16:creationId xmlns:a16="http://schemas.microsoft.com/office/drawing/2014/main" id="{DBA6ECAA-FB23-3C26-7FC4-D2B8AF74520F}"/>
+              </a:ext>
+            </a:extLst>
+          </p:cNvPr>
+          <p:cNvGraphicFramePr>
+            <a:graphicFrameLocks noGrp="1"/>
+          </p:cNvGraphicFramePr>
+          <p:nvPr>
+            <p:extLst>
+              <p:ext uri="{D42A27DB-BD31-4B8C-83A1-F6EECF244321}">
+                <p14:modId xmlns:p14="http://schemas.microsoft.com/office/powerpoint/2010/main" val="3748169277"/>
+              </p:ext>
+            </p:extLst>
+          </p:nvPr>
+        </p:nvGraphicFramePr>
+        <p:xfrm>
+          <a:off x="863819" y="4499769"/>
+          <a:ext cx="2388550" cy="4046220"/>
+        </p:xfrm>
+        <a:graphic>
+          <a:graphicData uri="http://schemas.openxmlformats.org/drawingml/2006/table">
+            <a:tbl>
+              <a:tblPr firstRow="1" bandRow="1">
+                <a:tableStyleId>{5940675A-B579-460E-94D1-54222C63F5DA}</a:tableStyleId>
+              </a:tblPr>
+              <a:tblGrid>
+                <a:gridCol w="2388550">
+                  <a:extLst>
+                    <a:ext uri="{9D8B030D-6E8A-4147-A177-3AD203B41FA5}">
+                      <a16:colId xmlns:a16="http://schemas.microsoft.com/office/drawing/2014/main" val="2587242417"/>
+                    </a:ext>
+                  </a:extLst>
+                </a:gridCol>
+              </a:tblGrid>
+              <a:tr h="110327">
+                <a:tc>
+                  <a:txBody>
+                    <a:bodyPr/>
+                    <a:lstStyle/>
+                    <a:p>
+                      <a:pPr algn="ctr"/>
+                      <a:r>
+                        <a:rPr lang="es-419" sz="900" dirty="0"/>
+                        <a:t>Huésped</a:t>
+                      </a:r>
+                      <a:endParaRPr lang="en-CO" sz="900" dirty="0"/>
+                    </a:p>
+                  </a:txBody>
+                  <a:tcPr marL="68580" marR="68580" marT="34290" marB="34290"/>
+                </a:tc>
+                <a:extLst>
+                  <a:ext uri="{0D108BD9-81ED-4DB2-BD59-A6C34878D82A}">
+                    <a16:rowId xmlns:a16="http://schemas.microsoft.com/office/drawing/2014/main" val="3263559475"/>
+                  </a:ext>
+                </a:extLst>
+              </a:tr>
+              <a:tr h="640080">
+                <a:tc>
+                  <a:txBody>
+                    <a:bodyPr/>
+                    <a:lstStyle/>
+                    <a:p>
+                      <a:r>
+                        <a:rPr lang="es-ES" sz="900" dirty="0"/>
+                        <a:t>- documento: </a:t>
+                      </a:r>
+                      <a:r>
+                        <a:rPr lang="es-ES" sz="900" dirty="0" err="1"/>
+                        <a:t>char</a:t>
+                      </a:r>
+                      <a:r>
+                        <a:rPr lang="es-ES" sz="900" dirty="0"/>
+                        <a:t>*</a:t>
+                      </a:r>
+                    </a:p>
+                    <a:p>
+                      <a:r>
+                        <a:rPr lang="es-ES" sz="900" dirty="0"/>
+                        <a:t>- nombre: </a:t>
+                      </a:r>
+                      <a:r>
+                        <a:rPr lang="es-ES" sz="900" dirty="0" err="1"/>
+                        <a:t>char</a:t>
+                      </a:r>
+                      <a:r>
+                        <a:rPr lang="es-ES" sz="900" dirty="0"/>
+                        <a:t>*</a:t>
+                      </a:r>
+                    </a:p>
+                    <a:p>
+                      <a:r>
+                        <a:rPr lang="es-ES" sz="900" dirty="0"/>
+                        <a:t>- </a:t>
+                      </a:r>
+                      <a:r>
+                        <a:rPr lang="es-ES" sz="900" dirty="0" err="1"/>
+                        <a:t>antiguedadEnMeses</a:t>
+                      </a:r>
+                      <a:r>
+                        <a:rPr lang="es-ES" sz="900" dirty="0"/>
+                        <a:t>: </a:t>
+                      </a:r>
+                      <a:r>
+                        <a:rPr lang="es-ES" sz="900" dirty="0" err="1"/>
+                        <a:t>int</a:t>
+                      </a:r>
+                      <a:endParaRPr lang="es-ES" sz="900" dirty="0"/>
+                    </a:p>
+                    <a:p>
+                      <a:r>
+                        <a:rPr lang="es-ES" sz="900" dirty="0"/>
+                        <a:t>- </a:t>
+                      </a:r>
+                      <a:r>
+                        <a:rPr lang="es-ES" sz="900" dirty="0" err="1"/>
+                        <a:t>puntuacion</a:t>
+                      </a:r>
+                      <a:r>
+                        <a:rPr lang="es-ES" sz="900" dirty="0"/>
+                        <a:t>: </a:t>
+                      </a:r>
+                      <a:r>
+                        <a:rPr lang="es-ES" sz="900" dirty="0" err="1"/>
+                        <a:t>float</a:t>
+                      </a:r>
+                      <a:endParaRPr lang="es-ES" sz="900" dirty="0"/>
+                    </a:p>
+                    <a:p>
+                      <a:r>
+                        <a:rPr lang="es-ES" sz="900" dirty="0"/>
+                        <a:t>- </a:t>
+                      </a:r>
+                      <a:r>
+                        <a:rPr lang="es-ES" sz="900" dirty="0" err="1"/>
+                        <a:t>listaReservas</a:t>
+                      </a:r>
+                      <a:r>
+                        <a:rPr lang="es-ES" sz="900" dirty="0"/>
+                        <a:t>: Reserva**</a:t>
+                      </a:r>
+                    </a:p>
+                    <a:p>
+                      <a:r>
+                        <a:rPr lang="es-ES" sz="900" dirty="0"/>
+                        <a:t>- </a:t>
+                      </a:r>
+                      <a:r>
+                        <a:rPr lang="es-ES" sz="900" dirty="0" err="1"/>
+                        <a:t>cantidadReservas</a:t>
+                      </a:r>
+                      <a:r>
+                        <a:rPr lang="es-ES" sz="900" dirty="0"/>
+                        <a:t>: </a:t>
+                      </a:r>
+                      <a:r>
+                        <a:rPr lang="es-ES" sz="900" dirty="0" err="1"/>
+                        <a:t>int</a:t>
+                      </a:r>
+                      <a:endParaRPr lang="es-ES" sz="900" dirty="0"/>
+                    </a:p>
+                    <a:p>
+                      <a:r>
+                        <a:rPr lang="es-ES" sz="900" dirty="0"/>
+                        <a:t>- </a:t>
+                      </a:r>
+                      <a:r>
+                        <a:rPr lang="es-ES" sz="900" dirty="0" err="1"/>
+                        <a:t>capacidadReservas</a:t>
+                      </a:r>
+                      <a:r>
+                        <a:rPr lang="es-ES" sz="900" dirty="0"/>
+                        <a:t>: </a:t>
+                      </a:r>
+                      <a:r>
+                        <a:rPr lang="es-ES" sz="900" dirty="0" err="1"/>
+                        <a:t>int</a:t>
+                      </a:r>
+                      <a:endParaRPr lang="en-CO" sz="900" dirty="0"/>
+                    </a:p>
+                  </a:txBody>
+                  <a:tcPr marL="68580" marR="68580" marT="34290" marB="34290"/>
+                </a:tc>
+                <a:extLst>
+                  <a:ext uri="{0D108BD9-81ED-4DB2-BD59-A6C34878D82A}">
+                    <a16:rowId xmlns:a16="http://schemas.microsoft.com/office/drawing/2014/main" val="2954312317"/>
+                  </a:ext>
+                </a:extLst>
+              </a:tr>
+              <a:tr h="1097280">
+                <a:tc>
+                  <a:txBody>
+                    <a:bodyPr/>
+                    <a:lstStyle/>
+                    <a:p>
+                      <a:r>
+                        <a:rPr lang="en-CO" sz="900" dirty="0"/>
+                        <a:t>+ Huesped(documento: char*, nombre: char*, antiguedad: int)</a:t>
+                      </a:r>
+                    </a:p>
+                    <a:p>
+                      <a:r>
+                        <a:rPr lang="en-CO" sz="900" dirty="0"/>
+                        <a:t>+ Huesped(const Huesped&amp; otro)</a:t>
+                      </a:r>
+                    </a:p>
+                    <a:p>
+                      <a:r>
+                        <a:rPr lang="en-CO" sz="900" dirty="0"/>
+                        <a:t>+ ~Huesped()</a:t>
+                      </a:r>
+                    </a:p>
+                    <a:p>
+                      <a:r>
+                        <a:rPr lang="en-CO" sz="900" dirty="0"/>
+                        <a:t>+ getDocumentoIdentidad(): char*</a:t>
+                      </a:r>
+                    </a:p>
+                    <a:p>
+                      <a:r>
+                        <a:rPr lang="en-CO" sz="900" dirty="0"/>
+                        <a:t>+ getNombreCompleto(): char*</a:t>
+                      </a:r>
+                    </a:p>
+                    <a:p>
+                      <a:r>
+                        <a:rPr lang="en-CO" sz="900" dirty="0"/>
+                        <a:t>+ setNombreCompleto(nombre: char*): void</a:t>
+                      </a:r>
+                    </a:p>
+                    <a:p>
+                      <a:r>
+                        <a:rPr lang="en-CO" sz="900" dirty="0"/>
+                        <a:t>+ getAntiguedadEnMeses(): int</a:t>
+                      </a:r>
+                    </a:p>
+                    <a:p>
+                      <a:r>
+                        <a:rPr lang="en-CO" sz="900" dirty="0"/>
+                        <a:t>+ getPuntuacion(): float</a:t>
+                      </a:r>
+                    </a:p>
+                    <a:p>
+                      <a:r>
+                        <a:rPr lang="en-CO" sz="900" dirty="0"/>
+                        <a:t>+ setPuntuacion(puntuacion: float): void</a:t>
+                      </a:r>
+                    </a:p>
+                    <a:p>
+                      <a:r>
+                        <a:rPr lang="en-CO" sz="900" dirty="0"/>
+                        <a:t>+ getCantidadReservas(): int</a:t>
+                      </a:r>
+                    </a:p>
+                    <a:p>
+                      <a:r>
+                        <a:rPr lang="en-CO" sz="900" dirty="0"/>
+                        <a:t>+ puedeReservar(fechaInicio: Fecha, duracion: int): bool</a:t>
+                      </a:r>
+                    </a:p>
+                    <a:p>
+                      <a:r>
+                        <a:rPr lang="en-CO" sz="900" dirty="0"/>
+                        <a:t>+ agregarReserva(reserva: Reserva*): void</a:t>
+                      </a:r>
+                    </a:p>
+                    <a:p>
+                      <a:r>
+                        <a:rPr lang="en-CO" sz="900" dirty="0"/>
+                        <a:t>+ anularReserva(codigoReserva: char*): void</a:t>
+                      </a:r>
+                    </a:p>
+                    <a:p>
+                      <a:r>
+                        <a:rPr lang="en-CO" sz="900" dirty="0"/>
+                        <a:t>+ consultarReservas(): void</a:t>
+                      </a:r>
+                      <a:br>
+                        <a:rPr lang="en-US" sz="900" dirty="0"/>
+                      </a:br>
+                      <a:r>
+                        <a:rPr lang="en-US" sz="900" dirty="0"/>
+                        <a:t>- int </a:t>
+                      </a:r>
+                      <a:r>
+                        <a:rPr lang="en-US" sz="900" dirty="0" err="1"/>
+                        <a:t>buscarReserva</a:t>
+                      </a:r>
+                      <a:r>
+                        <a:rPr lang="en-US" sz="900" dirty="0"/>
+                        <a:t>(char* </a:t>
+                      </a:r>
+                      <a:r>
+                        <a:rPr lang="en-US" sz="900" dirty="0" err="1"/>
+                        <a:t>codigo</a:t>
+                      </a:r>
+                      <a:r>
+                        <a:rPr lang="en-US" sz="900" dirty="0"/>
+                        <a:t>)</a:t>
+                      </a:r>
+                    </a:p>
+                    <a:p>
+                      <a:r>
+                        <a:rPr lang="en-US" sz="900" dirty="0"/>
+                        <a:t>- bool </a:t>
+                      </a:r>
+                      <a:r>
+                        <a:rPr lang="en-US" sz="900" dirty="0" err="1"/>
+                        <a:t>fechasSolapadas</a:t>
+                      </a:r>
+                      <a:r>
+                        <a:rPr lang="en-US" sz="900" dirty="0"/>
+                        <a:t>(</a:t>
+                      </a:r>
+                      <a:r>
+                        <a:rPr lang="en-US" sz="900" dirty="0" err="1"/>
+                        <a:t>Fecha</a:t>
+                      </a:r>
+                      <a:r>
+                        <a:rPr lang="en-US" sz="900" dirty="0"/>
+                        <a:t> </a:t>
+                      </a:r>
+                      <a:r>
+                        <a:rPr lang="en-US" sz="900" dirty="0" err="1"/>
+                        <a:t>inicio</a:t>
+                      </a:r>
+                      <a:r>
+                        <a:rPr lang="en-US" sz="900" dirty="0"/>
+                        <a:t>, int </a:t>
+                      </a:r>
+                      <a:r>
+                        <a:rPr lang="en-US" sz="900" dirty="0" err="1"/>
+                        <a:t>duracion</a:t>
+                      </a:r>
+                      <a:r>
+                        <a:rPr lang="en-US" sz="900" dirty="0"/>
+                        <a:t>)</a:t>
+                      </a:r>
+                    </a:p>
+                    <a:p>
+                      <a:r>
+                        <a:rPr lang="en-US" sz="900" dirty="0"/>
+                        <a:t>- void </a:t>
+                      </a:r>
+                      <a:r>
+                        <a:rPr lang="en-US" sz="900" dirty="0" err="1"/>
+                        <a:t>expandirReservas</a:t>
+                      </a:r>
+                      <a:r>
+                        <a:rPr lang="en-US" sz="900" dirty="0"/>
+                        <a:t>()</a:t>
                       </a:r>
                       <a:endParaRPr lang="en-CO" sz="900" dirty="0"/>
                     </a:p>

</xml_diff>

<commit_message>
5 Secciones de UdeaStay
Se empieza con el desarrollo de UdeAtay y se logra avanzar las primeras 5 secciones pero todavia no han sido probadas, se agrega nueva info en los txt para probar luego y se agrega un nuevo setter en afitrion para establecer  un documento especifico cuando se crea un anfitrion. Se usa mas que todo cuando se carga a partir de un txt y se sabe el documento real.
</commit_message>
<xml_diff>
--- a/Documentos/Diagrama de clases .pptx
+++ b/Documentos/Diagrama de clases .pptx
@@ -244,7 +244,7 @@
           <a:p>
             <a:fld id="{761B82EC-0E7A-1D43-9F13-C1D8E66B749A}" type="datetimeFigureOut">
               <a:rPr lang="en-CO" smtClean="0"/>
-              <a:t>05/19/2025</a:t>
+              <a:t>05/25/2025</a:t>
             </a:fld>
             <a:endParaRPr lang="en-CO"/>
           </a:p>
@@ -414,7 +414,7 @@
           <a:p>
             <a:fld id="{761B82EC-0E7A-1D43-9F13-C1D8E66B749A}" type="datetimeFigureOut">
               <a:rPr lang="en-CO" smtClean="0"/>
-              <a:t>05/19/2025</a:t>
+              <a:t>05/25/2025</a:t>
             </a:fld>
             <a:endParaRPr lang="en-CO"/>
           </a:p>
@@ -594,7 +594,7 @@
           <a:p>
             <a:fld id="{761B82EC-0E7A-1D43-9F13-C1D8E66B749A}" type="datetimeFigureOut">
               <a:rPr lang="en-CO" smtClean="0"/>
-              <a:t>05/19/2025</a:t>
+              <a:t>05/25/2025</a:t>
             </a:fld>
             <a:endParaRPr lang="en-CO"/>
           </a:p>
@@ -764,7 +764,7 @@
           <a:p>
             <a:fld id="{761B82EC-0E7A-1D43-9F13-C1D8E66B749A}" type="datetimeFigureOut">
               <a:rPr lang="en-CO" smtClean="0"/>
-              <a:t>05/19/2025</a:t>
+              <a:t>05/25/2025</a:t>
             </a:fld>
             <a:endParaRPr lang="en-CO"/>
           </a:p>
@@ -1010,7 +1010,7 @@
           <a:p>
             <a:fld id="{761B82EC-0E7A-1D43-9F13-C1D8E66B749A}" type="datetimeFigureOut">
               <a:rPr lang="en-CO" smtClean="0"/>
-              <a:t>05/19/2025</a:t>
+              <a:t>05/25/2025</a:t>
             </a:fld>
             <a:endParaRPr lang="en-CO"/>
           </a:p>
@@ -1242,7 +1242,7 @@
           <a:p>
             <a:fld id="{761B82EC-0E7A-1D43-9F13-C1D8E66B749A}" type="datetimeFigureOut">
               <a:rPr lang="en-CO" smtClean="0"/>
-              <a:t>05/19/2025</a:t>
+              <a:t>05/25/2025</a:t>
             </a:fld>
             <a:endParaRPr lang="en-CO"/>
           </a:p>
@@ -1609,7 +1609,7 @@
           <a:p>
             <a:fld id="{761B82EC-0E7A-1D43-9F13-C1D8E66B749A}" type="datetimeFigureOut">
               <a:rPr lang="en-CO" smtClean="0"/>
-              <a:t>05/19/2025</a:t>
+              <a:t>05/25/2025</a:t>
             </a:fld>
             <a:endParaRPr lang="en-CO"/>
           </a:p>
@@ -1727,7 +1727,7 @@
           <a:p>
             <a:fld id="{761B82EC-0E7A-1D43-9F13-C1D8E66B749A}" type="datetimeFigureOut">
               <a:rPr lang="en-CO" smtClean="0"/>
-              <a:t>05/19/2025</a:t>
+              <a:t>05/25/2025</a:t>
             </a:fld>
             <a:endParaRPr lang="en-CO"/>
           </a:p>
@@ -1822,7 +1822,7 @@
           <a:p>
             <a:fld id="{761B82EC-0E7A-1D43-9F13-C1D8E66B749A}" type="datetimeFigureOut">
               <a:rPr lang="en-CO" smtClean="0"/>
-              <a:t>05/19/2025</a:t>
+              <a:t>05/25/2025</a:t>
             </a:fld>
             <a:endParaRPr lang="en-CO"/>
           </a:p>
@@ -2099,7 +2099,7 @@
           <a:p>
             <a:fld id="{761B82EC-0E7A-1D43-9F13-C1D8E66B749A}" type="datetimeFigureOut">
               <a:rPr lang="en-CO" smtClean="0"/>
-              <a:t>05/19/2025</a:t>
+              <a:t>05/25/2025</a:t>
             </a:fld>
             <a:endParaRPr lang="en-CO"/>
           </a:p>
@@ -2356,7 +2356,7 @@
           <a:p>
             <a:fld id="{761B82EC-0E7A-1D43-9F13-C1D8E66B749A}" type="datetimeFigureOut">
               <a:rPr lang="en-CO" smtClean="0"/>
-              <a:t>05/19/2025</a:t>
+              <a:t>05/25/2025</a:t>
             </a:fld>
             <a:endParaRPr lang="en-CO"/>
           </a:p>
@@ -2569,7 +2569,7 @@
           <a:p>
             <a:fld id="{761B82EC-0E7A-1D43-9F13-C1D8E66B749A}" type="datetimeFigureOut">
               <a:rPr lang="en-CO" smtClean="0"/>
-              <a:t>05/19/2025</a:t>
+              <a:t>05/25/2025</a:t>
             </a:fld>
             <a:endParaRPr lang="en-CO"/>
           </a:p>
@@ -6632,14 +6632,14 @@
           <p:nvPr>
             <p:extLst>
               <p:ext uri="{D42A27DB-BD31-4B8C-83A1-F6EECF244321}">
-                <p14:modId xmlns:p14="http://schemas.microsoft.com/office/powerpoint/2010/main" val="3097733784"/>
+                <p14:modId xmlns:p14="http://schemas.microsoft.com/office/powerpoint/2010/main" val="2705940708"/>
               </p:ext>
             </p:extLst>
           </p:nvPr>
         </p:nvGraphicFramePr>
         <p:xfrm>
           <a:off x="3467323" y="1214431"/>
-          <a:ext cx="2388550" cy="3771900"/>
+          <a:ext cx="2388550" cy="4046220"/>
         </p:xfrm>
         <a:graphic>
           <a:graphicData uri="http://schemas.openxmlformats.org/drawingml/2006/table">
@@ -7142,6 +7142,33 @@
                       </a:r>
                       <a:r>
                         <a:rPr lang="es-419" sz="900" dirty="0" err="1"/>
+                        <a:t>void</a:t>
+                      </a:r>
+                      <a:br>
+                        <a:rPr lang="es-419" sz="900" dirty="0"/>
+                      </a:br>
+                      <a:r>
+                        <a:rPr lang="es-419" sz="900" dirty="0"/>
+                        <a:t>+ </a:t>
+                      </a:r>
+                      <a:r>
+                        <a:rPr lang="es-419" sz="900" dirty="0" err="1"/>
+                        <a:t>setDocumentoIdentidad</a:t>
+                      </a:r>
+                      <a:r>
+                        <a:rPr lang="es-419" sz="900" dirty="0"/>
+                        <a:t>(documento: </a:t>
+                      </a:r>
+                      <a:r>
+                        <a:rPr lang="es-419" sz="900" dirty="0" err="1"/>
+                        <a:t>char</a:t>
+                      </a:r>
+                      <a:r>
+                        <a:rPr lang="es-419" sz="900" dirty="0"/>
+                        <a:t>*): </a:t>
+                      </a:r>
+                      <a:r>
+                        <a:rPr lang="es-419" sz="900"/>
                         <a:t>void</a:t>
                       </a:r>
                       <a:br>

</xml_diff>